<commit_message>
changes to PPT and Doc and code
</commit_message>
<xml_diff>
--- a/Tornados PPT.pptx
+++ b/Tornados PPT.pptx
@@ -151,7 +151,2859 @@
       </a:defRPr>
     </a:lvl9pPr>
   </p:defaultTextStyle>
+  <p:extLst>
+    <p:ext uri="{EFAFB233-063F-42B5-8137-9DF3F51BA10A}">
+      <p15:sldGuideLst xmlns:p15="http://schemas.microsoft.com/office/powerpoint/2012/main"/>
+    </p:ext>
+    <p:ext uri="{2D200454-40CA-4A62-9FC3-DE9A4176ACB9}">
+      <p15:notesGuideLst xmlns:p15="http://schemas.microsoft.com/office/powerpoint/2012/main"/>
+    </p:ext>
+  </p:extLst>
 </p:presentation>
+</file>
+
+<file path=ppt/diagrams/colors1.xml><?xml version="1.0" encoding="utf-8"?>
+<dgm:colorsDef xmlns:dgm="http://schemas.openxmlformats.org/drawingml/2006/diagram" xmlns:a="http://schemas.openxmlformats.org/drawingml/2006/main" uniqueId="urn:microsoft.com/office/officeart/2005/8/colors/accent0_1">
+  <dgm:title val=""/>
+  <dgm:desc val=""/>
+  <dgm:catLst>
+    <dgm:cat type="mainScheme" pri="10100"/>
+  </dgm:catLst>
+  <dgm:styleLbl name="node0">
+    <dgm:fillClrLst meth="repeat">
+      <a:schemeClr val="lt1"/>
+    </dgm:fillClrLst>
+    <dgm:linClrLst meth="repeat">
+      <a:schemeClr val="dk1">
+        <a:shade val="80000"/>
+      </a:schemeClr>
+    </dgm:linClrLst>
+    <dgm:effectClrLst/>
+    <dgm:txLinClrLst/>
+    <dgm:txFillClrLst meth="repeat">
+      <a:schemeClr val="dk1"/>
+    </dgm:txFillClrLst>
+    <dgm:txEffectClrLst/>
+  </dgm:styleLbl>
+  <dgm:styleLbl name="node1">
+    <dgm:fillClrLst meth="repeat">
+      <a:schemeClr val="lt1"/>
+    </dgm:fillClrLst>
+    <dgm:linClrLst meth="repeat">
+      <a:schemeClr val="dk1">
+        <a:shade val="80000"/>
+      </a:schemeClr>
+    </dgm:linClrLst>
+    <dgm:effectClrLst/>
+    <dgm:txLinClrLst/>
+    <dgm:txFillClrLst meth="repeat">
+      <a:schemeClr val="dk1"/>
+    </dgm:txFillClrLst>
+    <dgm:txEffectClrLst/>
+  </dgm:styleLbl>
+  <dgm:styleLbl name="alignNode1">
+    <dgm:fillClrLst meth="repeat">
+      <a:schemeClr val="lt1"/>
+    </dgm:fillClrLst>
+    <dgm:linClrLst meth="repeat">
+      <a:schemeClr val="dk1">
+        <a:shade val="80000"/>
+      </a:schemeClr>
+    </dgm:linClrLst>
+    <dgm:effectClrLst/>
+    <dgm:txLinClrLst/>
+    <dgm:txFillClrLst meth="repeat">
+      <a:schemeClr val="dk1"/>
+    </dgm:txFillClrLst>
+    <dgm:txEffectClrLst/>
+  </dgm:styleLbl>
+  <dgm:styleLbl name="lnNode1">
+    <dgm:fillClrLst meth="repeat">
+      <a:schemeClr val="lt1"/>
+    </dgm:fillClrLst>
+    <dgm:linClrLst meth="repeat">
+      <a:schemeClr val="dk1">
+        <a:shade val="80000"/>
+      </a:schemeClr>
+    </dgm:linClrLst>
+    <dgm:effectClrLst/>
+    <dgm:txLinClrLst/>
+    <dgm:txFillClrLst meth="repeat">
+      <a:schemeClr val="dk1"/>
+    </dgm:txFillClrLst>
+    <dgm:txEffectClrLst/>
+  </dgm:styleLbl>
+  <dgm:styleLbl name="vennNode1">
+    <dgm:fillClrLst meth="repeat">
+      <a:schemeClr val="lt1">
+        <a:alpha val="50000"/>
+      </a:schemeClr>
+    </dgm:fillClrLst>
+    <dgm:linClrLst meth="repeat">
+      <a:schemeClr val="dk1">
+        <a:shade val="80000"/>
+      </a:schemeClr>
+    </dgm:linClrLst>
+    <dgm:effectClrLst/>
+    <dgm:txLinClrLst/>
+    <dgm:txFillClrLst/>
+    <dgm:txEffectClrLst/>
+  </dgm:styleLbl>
+  <dgm:styleLbl name="node2">
+    <dgm:fillClrLst meth="repeat">
+      <a:schemeClr val="lt1"/>
+    </dgm:fillClrLst>
+    <dgm:linClrLst meth="repeat">
+      <a:schemeClr val="dk1">
+        <a:shade val="80000"/>
+      </a:schemeClr>
+    </dgm:linClrLst>
+    <dgm:effectClrLst/>
+    <dgm:txLinClrLst/>
+    <dgm:txFillClrLst meth="repeat">
+      <a:schemeClr val="dk1"/>
+    </dgm:txFillClrLst>
+    <dgm:txEffectClrLst/>
+  </dgm:styleLbl>
+  <dgm:styleLbl name="node3">
+    <dgm:fillClrLst meth="repeat">
+      <a:schemeClr val="lt1"/>
+    </dgm:fillClrLst>
+    <dgm:linClrLst meth="repeat">
+      <a:schemeClr val="dk1">
+        <a:shade val="80000"/>
+      </a:schemeClr>
+    </dgm:linClrLst>
+    <dgm:effectClrLst/>
+    <dgm:txLinClrLst/>
+    <dgm:txFillClrLst meth="repeat">
+      <a:schemeClr val="dk1"/>
+    </dgm:txFillClrLst>
+    <dgm:txEffectClrLst/>
+  </dgm:styleLbl>
+  <dgm:styleLbl name="node4">
+    <dgm:fillClrLst meth="repeat">
+      <a:schemeClr val="lt1"/>
+    </dgm:fillClrLst>
+    <dgm:linClrLst meth="repeat">
+      <a:schemeClr val="dk1">
+        <a:shade val="80000"/>
+      </a:schemeClr>
+    </dgm:linClrLst>
+    <dgm:effectClrLst/>
+    <dgm:txLinClrLst/>
+    <dgm:txFillClrLst meth="repeat">
+      <a:schemeClr val="dk1"/>
+    </dgm:txFillClrLst>
+    <dgm:txEffectClrLst/>
+  </dgm:styleLbl>
+  <dgm:styleLbl name="fgImgPlace1">
+    <dgm:fillClrLst meth="repeat">
+      <a:schemeClr val="dk1">
+        <a:tint val="40000"/>
+      </a:schemeClr>
+    </dgm:fillClrLst>
+    <dgm:linClrLst meth="repeat">
+      <a:schemeClr val="dk1">
+        <a:shade val="80000"/>
+      </a:schemeClr>
+    </dgm:linClrLst>
+    <dgm:effectClrLst/>
+    <dgm:txLinClrLst/>
+    <dgm:txFillClrLst meth="repeat">
+      <a:schemeClr val="lt1"/>
+    </dgm:txFillClrLst>
+    <dgm:txEffectClrLst/>
+  </dgm:styleLbl>
+  <dgm:styleLbl name="alignImgPlace1">
+    <dgm:fillClrLst meth="repeat">
+      <a:schemeClr val="dk1">
+        <a:tint val="40000"/>
+      </a:schemeClr>
+    </dgm:fillClrLst>
+    <dgm:linClrLst meth="repeat">
+      <a:schemeClr val="dk1">
+        <a:shade val="80000"/>
+      </a:schemeClr>
+    </dgm:linClrLst>
+    <dgm:effectClrLst/>
+    <dgm:txLinClrLst/>
+    <dgm:txFillClrLst meth="repeat">
+      <a:schemeClr val="lt1"/>
+    </dgm:txFillClrLst>
+    <dgm:txEffectClrLst/>
+  </dgm:styleLbl>
+  <dgm:styleLbl name="bgImgPlace1">
+    <dgm:fillClrLst meth="repeat">
+      <a:schemeClr val="dk1">
+        <a:tint val="40000"/>
+      </a:schemeClr>
+    </dgm:fillClrLst>
+    <dgm:linClrLst meth="repeat">
+      <a:schemeClr val="dk1">
+        <a:shade val="80000"/>
+      </a:schemeClr>
+    </dgm:linClrLst>
+    <dgm:effectClrLst/>
+    <dgm:txLinClrLst/>
+    <dgm:txFillClrLst meth="repeat">
+      <a:schemeClr val="lt1"/>
+    </dgm:txFillClrLst>
+    <dgm:txEffectClrLst/>
+  </dgm:styleLbl>
+  <dgm:styleLbl name="sibTrans2D1">
+    <dgm:fillClrLst meth="repeat">
+      <a:schemeClr val="dk1">
+        <a:tint val="60000"/>
+      </a:schemeClr>
+    </dgm:fillClrLst>
+    <dgm:linClrLst meth="repeat">
+      <a:schemeClr val="dk1">
+        <a:tint val="60000"/>
+      </a:schemeClr>
+    </dgm:linClrLst>
+    <dgm:effectClrLst/>
+    <dgm:txLinClrLst/>
+    <dgm:txFillClrLst meth="repeat">
+      <a:schemeClr val="dk1"/>
+    </dgm:txFillClrLst>
+    <dgm:txEffectClrLst/>
+  </dgm:styleLbl>
+  <dgm:styleLbl name="fgSibTrans2D1">
+    <dgm:fillClrLst meth="repeat">
+      <a:schemeClr val="dk1">
+        <a:tint val="60000"/>
+      </a:schemeClr>
+    </dgm:fillClrLst>
+    <dgm:linClrLst meth="repeat">
+      <a:schemeClr val="dk1">
+        <a:tint val="60000"/>
+      </a:schemeClr>
+    </dgm:linClrLst>
+    <dgm:effectClrLst/>
+    <dgm:txLinClrLst/>
+    <dgm:txFillClrLst meth="repeat">
+      <a:schemeClr val="dk1"/>
+    </dgm:txFillClrLst>
+    <dgm:txEffectClrLst/>
+  </dgm:styleLbl>
+  <dgm:styleLbl name="bgSibTrans2D1">
+    <dgm:fillClrLst meth="repeat">
+      <a:schemeClr val="dk1">
+        <a:tint val="60000"/>
+      </a:schemeClr>
+    </dgm:fillClrLst>
+    <dgm:linClrLst meth="repeat">
+      <a:schemeClr val="dk1">
+        <a:tint val="60000"/>
+      </a:schemeClr>
+    </dgm:linClrLst>
+    <dgm:effectClrLst/>
+    <dgm:txLinClrLst/>
+    <dgm:txFillClrLst meth="repeat">
+      <a:schemeClr val="dk1"/>
+    </dgm:txFillClrLst>
+    <dgm:txEffectClrLst/>
+  </dgm:styleLbl>
+  <dgm:styleLbl name="sibTrans1D1">
+    <dgm:fillClrLst meth="repeat">
+      <a:schemeClr val="dk1"/>
+    </dgm:fillClrLst>
+    <dgm:linClrLst meth="repeat">
+      <a:schemeClr val="dk1"/>
+    </dgm:linClrLst>
+    <dgm:effectClrLst/>
+    <dgm:txLinClrLst/>
+    <dgm:txFillClrLst meth="repeat">
+      <a:schemeClr val="tx1"/>
+    </dgm:txFillClrLst>
+    <dgm:txEffectClrLst/>
+  </dgm:styleLbl>
+  <dgm:styleLbl name="callout">
+    <dgm:fillClrLst meth="repeat">
+      <a:schemeClr val="dk1"/>
+    </dgm:fillClrLst>
+    <dgm:linClrLst meth="repeat">
+      <a:schemeClr val="dk1"/>
+    </dgm:linClrLst>
+    <dgm:effectClrLst/>
+    <dgm:txLinClrLst/>
+    <dgm:txFillClrLst meth="repeat">
+      <a:schemeClr val="tx1"/>
+    </dgm:txFillClrLst>
+    <dgm:txEffectClrLst/>
+  </dgm:styleLbl>
+  <dgm:styleLbl name="asst0">
+    <dgm:fillClrLst meth="repeat">
+      <a:schemeClr val="lt1"/>
+    </dgm:fillClrLst>
+    <dgm:linClrLst meth="repeat">
+      <a:schemeClr val="dk1">
+        <a:shade val="80000"/>
+      </a:schemeClr>
+    </dgm:linClrLst>
+    <dgm:effectClrLst/>
+    <dgm:txLinClrLst/>
+    <dgm:txFillClrLst meth="repeat">
+      <a:schemeClr val="dk1"/>
+    </dgm:txFillClrLst>
+    <dgm:txEffectClrLst/>
+  </dgm:styleLbl>
+  <dgm:styleLbl name="asst1">
+    <dgm:fillClrLst meth="repeat">
+      <a:schemeClr val="lt1"/>
+    </dgm:fillClrLst>
+    <dgm:linClrLst meth="repeat">
+      <a:schemeClr val="dk1">
+        <a:shade val="80000"/>
+      </a:schemeClr>
+    </dgm:linClrLst>
+    <dgm:effectClrLst/>
+    <dgm:txLinClrLst/>
+    <dgm:txFillClrLst meth="repeat">
+      <a:schemeClr val="dk1"/>
+    </dgm:txFillClrLst>
+    <dgm:txEffectClrLst/>
+  </dgm:styleLbl>
+  <dgm:styleLbl name="asst2">
+    <dgm:fillClrLst meth="repeat">
+      <a:schemeClr val="lt1"/>
+    </dgm:fillClrLst>
+    <dgm:linClrLst meth="repeat">
+      <a:schemeClr val="dk1">
+        <a:shade val="80000"/>
+      </a:schemeClr>
+    </dgm:linClrLst>
+    <dgm:effectClrLst/>
+    <dgm:txLinClrLst/>
+    <dgm:txFillClrLst meth="repeat">
+      <a:schemeClr val="dk1"/>
+    </dgm:txFillClrLst>
+    <dgm:txEffectClrLst/>
+  </dgm:styleLbl>
+  <dgm:styleLbl name="asst3">
+    <dgm:fillClrLst meth="repeat">
+      <a:schemeClr val="lt1"/>
+    </dgm:fillClrLst>
+    <dgm:linClrLst meth="repeat">
+      <a:schemeClr val="dk1">
+        <a:shade val="80000"/>
+      </a:schemeClr>
+    </dgm:linClrLst>
+    <dgm:effectClrLst/>
+    <dgm:txLinClrLst/>
+    <dgm:txFillClrLst meth="repeat">
+      <a:schemeClr val="dk1"/>
+    </dgm:txFillClrLst>
+    <dgm:txEffectClrLst/>
+  </dgm:styleLbl>
+  <dgm:styleLbl name="asst4">
+    <dgm:fillClrLst meth="repeat">
+      <a:schemeClr val="lt1"/>
+    </dgm:fillClrLst>
+    <dgm:linClrLst meth="repeat">
+      <a:schemeClr val="dk1">
+        <a:shade val="80000"/>
+      </a:schemeClr>
+    </dgm:linClrLst>
+    <dgm:effectClrLst/>
+    <dgm:txLinClrLst/>
+    <dgm:txFillClrLst meth="repeat">
+      <a:schemeClr val="dk1"/>
+    </dgm:txFillClrLst>
+    <dgm:txEffectClrLst/>
+  </dgm:styleLbl>
+  <dgm:styleLbl name="parChTrans2D1">
+    <dgm:fillClrLst meth="repeat">
+      <a:schemeClr val="dk1">
+        <a:tint val="60000"/>
+      </a:schemeClr>
+    </dgm:fillClrLst>
+    <dgm:linClrLst meth="repeat">
+      <a:schemeClr val="dk1">
+        <a:tint val="60000"/>
+      </a:schemeClr>
+    </dgm:linClrLst>
+    <dgm:effectClrLst/>
+    <dgm:txLinClrLst/>
+    <dgm:txFillClrLst/>
+    <dgm:txEffectClrLst/>
+  </dgm:styleLbl>
+  <dgm:styleLbl name="parChTrans2D2">
+    <dgm:fillClrLst meth="repeat">
+      <a:schemeClr val="dk1"/>
+    </dgm:fillClrLst>
+    <dgm:linClrLst meth="repeat">
+      <a:schemeClr val="dk1"/>
+    </dgm:linClrLst>
+    <dgm:effectClrLst/>
+    <dgm:txLinClrLst/>
+    <dgm:txFillClrLst/>
+    <dgm:txEffectClrLst/>
+  </dgm:styleLbl>
+  <dgm:styleLbl name="parChTrans2D3">
+    <dgm:fillClrLst meth="repeat">
+      <a:schemeClr val="dk1"/>
+    </dgm:fillClrLst>
+    <dgm:linClrLst meth="repeat">
+      <a:schemeClr val="dk1"/>
+    </dgm:linClrLst>
+    <dgm:effectClrLst/>
+    <dgm:txLinClrLst/>
+    <dgm:txFillClrLst/>
+    <dgm:txEffectClrLst/>
+  </dgm:styleLbl>
+  <dgm:styleLbl name="parChTrans2D4">
+    <dgm:fillClrLst meth="repeat">
+      <a:schemeClr val="dk1"/>
+    </dgm:fillClrLst>
+    <dgm:linClrLst meth="repeat">
+      <a:schemeClr val="dk1"/>
+    </dgm:linClrLst>
+    <dgm:effectClrLst/>
+    <dgm:txLinClrLst/>
+    <dgm:txFillClrLst meth="repeat">
+      <a:schemeClr val="lt1"/>
+    </dgm:txFillClrLst>
+    <dgm:txEffectClrLst/>
+  </dgm:styleLbl>
+  <dgm:styleLbl name="parChTrans1D1">
+    <dgm:fillClrLst meth="repeat">
+      <a:schemeClr val="dk1"/>
+    </dgm:fillClrLst>
+    <dgm:linClrLst meth="repeat">
+      <a:schemeClr val="dk1">
+        <a:shade val="60000"/>
+      </a:schemeClr>
+    </dgm:linClrLst>
+    <dgm:effectClrLst/>
+    <dgm:txLinClrLst/>
+    <dgm:txFillClrLst meth="repeat">
+      <a:schemeClr val="tx1"/>
+    </dgm:txFillClrLst>
+    <dgm:txEffectClrLst/>
+  </dgm:styleLbl>
+  <dgm:styleLbl name="parChTrans1D2">
+    <dgm:fillClrLst meth="repeat">
+      <a:schemeClr val="dk1"/>
+    </dgm:fillClrLst>
+    <dgm:linClrLst meth="repeat">
+      <a:schemeClr val="dk1">
+        <a:shade val="60000"/>
+      </a:schemeClr>
+    </dgm:linClrLst>
+    <dgm:effectClrLst/>
+    <dgm:txLinClrLst/>
+    <dgm:txFillClrLst meth="repeat">
+      <a:schemeClr val="tx1"/>
+    </dgm:txFillClrLst>
+    <dgm:txEffectClrLst/>
+  </dgm:styleLbl>
+  <dgm:styleLbl name="parChTrans1D3">
+    <dgm:fillClrLst meth="repeat">
+      <a:schemeClr val="dk1"/>
+    </dgm:fillClrLst>
+    <dgm:linClrLst meth="repeat">
+      <a:schemeClr val="dk1">
+        <a:shade val="80000"/>
+      </a:schemeClr>
+    </dgm:linClrLst>
+    <dgm:effectClrLst/>
+    <dgm:txLinClrLst/>
+    <dgm:txFillClrLst meth="repeat">
+      <a:schemeClr val="tx1"/>
+    </dgm:txFillClrLst>
+    <dgm:txEffectClrLst/>
+  </dgm:styleLbl>
+  <dgm:styleLbl name="parChTrans1D4">
+    <dgm:fillClrLst meth="repeat">
+      <a:schemeClr val="dk1"/>
+    </dgm:fillClrLst>
+    <dgm:linClrLst meth="repeat">
+      <a:schemeClr val="dk1">
+        <a:shade val="80000"/>
+      </a:schemeClr>
+    </dgm:linClrLst>
+    <dgm:effectClrLst/>
+    <dgm:txLinClrLst/>
+    <dgm:txFillClrLst meth="repeat">
+      <a:schemeClr val="tx1"/>
+    </dgm:txFillClrLst>
+    <dgm:txEffectClrLst/>
+  </dgm:styleLbl>
+  <dgm:styleLbl name="fgAcc1">
+    <dgm:fillClrLst meth="repeat">
+      <a:schemeClr val="dk1">
+        <a:alpha val="90000"/>
+        <a:tint val="40000"/>
+      </a:schemeClr>
+    </dgm:fillClrLst>
+    <dgm:linClrLst meth="repeat">
+      <a:schemeClr val="dk1"/>
+    </dgm:linClrLst>
+    <dgm:effectClrLst/>
+    <dgm:txLinClrLst/>
+    <dgm:txFillClrLst meth="repeat">
+      <a:schemeClr val="dk1"/>
+    </dgm:txFillClrLst>
+    <dgm:txEffectClrLst/>
+  </dgm:styleLbl>
+  <dgm:styleLbl name="conFgAcc1">
+    <dgm:fillClrLst meth="repeat">
+      <a:schemeClr val="dk1">
+        <a:alpha val="90000"/>
+        <a:tint val="40000"/>
+      </a:schemeClr>
+    </dgm:fillClrLst>
+    <dgm:linClrLst meth="repeat">
+      <a:schemeClr val="dk1"/>
+    </dgm:linClrLst>
+    <dgm:effectClrLst/>
+    <dgm:txLinClrLst/>
+    <dgm:txFillClrLst meth="repeat">
+      <a:schemeClr val="dk1"/>
+    </dgm:txFillClrLst>
+    <dgm:txEffectClrLst/>
+  </dgm:styleLbl>
+  <dgm:styleLbl name="alignAcc1">
+    <dgm:fillClrLst meth="repeat">
+      <a:schemeClr val="dk1">
+        <a:alpha val="90000"/>
+        <a:tint val="40000"/>
+      </a:schemeClr>
+    </dgm:fillClrLst>
+    <dgm:linClrLst meth="repeat">
+      <a:schemeClr val="dk1"/>
+    </dgm:linClrLst>
+    <dgm:effectClrLst/>
+    <dgm:txLinClrLst/>
+    <dgm:txFillClrLst meth="repeat">
+      <a:schemeClr val="dk1"/>
+    </dgm:txFillClrLst>
+    <dgm:txEffectClrLst/>
+  </dgm:styleLbl>
+  <dgm:styleLbl name="trAlignAcc1">
+    <dgm:fillClrLst meth="repeat">
+      <a:schemeClr val="dk1">
+        <a:alpha val="40000"/>
+        <a:tint val="40000"/>
+      </a:schemeClr>
+    </dgm:fillClrLst>
+    <dgm:linClrLst meth="repeat">
+      <a:schemeClr val="dk1"/>
+    </dgm:linClrLst>
+    <dgm:effectClrLst/>
+    <dgm:txLinClrLst/>
+    <dgm:txFillClrLst meth="repeat">
+      <a:schemeClr val="dk1"/>
+    </dgm:txFillClrLst>
+    <dgm:txEffectClrLst/>
+  </dgm:styleLbl>
+  <dgm:styleLbl name="bgAcc1">
+    <dgm:fillClrLst meth="repeat">
+      <a:schemeClr val="dk1">
+        <a:alpha val="90000"/>
+        <a:tint val="40000"/>
+      </a:schemeClr>
+    </dgm:fillClrLst>
+    <dgm:linClrLst meth="repeat">
+      <a:schemeClr val="dk1"/>
+    </dgm:linClrLst>
+    <dgm:effectClrLst/>
+    <dgm:txLinClrLst/>
+    <dgm:txFillClrLst meth="repeat">
+      <a:schemeClr val="dk1"/>
+    </dgm:txFillClrLst>
+    <dgm:txEffectClrLst/>
+  </dgm:styleLbl>
+  <dgm:styleLbl name="solidFgAcc1">
+    <dgm:fillClrLst meth="repeat">
+      <a:schemeClr val="lt1"/>
+    </dgm:fillClrLst>
+    <dgm:linClrLst meth="repeat">
+      <a:schemeClr val="dk1"/>
+    </dgm:linClrLst>
+    <dgm:effectClrLst/>
+    <dgm:txLinClrLst/>
+    <dgm:txFillClrLst meth="repeat">
+      <a:schemeClr val="dk1"/>
+    </dgm:txFillClrLst>
+    <dgm:txEffectClrLst/>
+  </dgm:styleLbl>
+  <dgm:styleLbl name="solidAlignAcc1">
+    <dgm:fillClrLst meth="repeat">
+      <a:schemeClr val="lt1"/>
+    </dgm:fillClrLst>
+    <dgm:linClrLst meth="repeat">
+      <a:schemeClr val="dk1"/>
+    </dgm:linClrLst>
+    <dgm:effectClrLst/>
+    <dgm:txLinClrLst/>
+    <dgm:txFillClrLst meth="repeat">
+      <a:schemeClr val="dk1"/>
+    </dgm:txFillClrLst>
+    <dgm:txEffectClrLst/>
+  </dgm:styleLbl>
+  <dgm:styleLbl name="solidBgAcc1">
+    <dgm:fillClrLst meth="repeat">
+      <a:schemeClr val="lt1"/>
+    </dgm:fillClrLst>
+    <dgm:linClrLst meth="repeat">
+      <a:schemeClr val="dk1"/>
+    </dgm:linClrLst>
+    <dgm:effectClrLst/>
+    <dgm:txLinClrLst/>
+    <dgm:txFillClrLst meth="repeat">
+      <a:schemeClr val="dk1"/>
+    </dgm:txFillClrLst>
+    <dgm:txEffectClrLst/>
+  </dgm:styleLbl>
+  <dgm:styleLbl name="fgAccFollowNode1">
+    <dgm:fillClrLst meth="repeat">
+      <a:schemeClr val="lt1">
+        <a:alpha val="90000"/>
+        <a:tint val="40000"/>
+      </a:schemeClr>
+    </dgm:fillClrLst>
+    <dgm:linClrLst meth="repeat">
+      <a:schemeClr val="dk1">
+        <a:alpha val="90000"/>
+      </a:schemeClr>
+    </dgm:linClrLst>
+    <dgm:effectClrLst/>
+    <dgm:txLinClrLst/>
+    <dgm:txFillClrLst meth="repeat">
+      <a:schemeClr val="dk1"/>
+    </dgm:txFillClrLst>
+    <dgm:txEffectClrLst/>
+  </dgm:styleLbl>
+  <dgm:styleLbl name="alignAccFollowNode1">
+    <dgm:fillClrLst meth="repeat">
+      <a:schemeClr val="lt1">
+        <a:alpha val="90000"/>
+        <a:tint val="40000"/>
+      </a:schemeClr>
+    </dgm:fillClrLst>
+    <dgm:linClrLst meth="repeat">
+      <a:schemeClr val="dk1">
+        <a:alpha val="90000"/>
+      </a:schemeClr>
+    </dgm:linClrLst>
+    <dgm:effectClrLst/>
+    <dgm:txLinClrLst/>
+    <dgm:txFillClrLst meth="repeat">
+      <a:schemeClr val="dk1"/>
+    </dgm:txFillClrLst>
+    <dgm:txEffectClrLst/>
+  </dgm:styleLbl>
+  <dgm:styleLbl name="bgAccFollowNode1">
+    <dgm:fillClrLst meth="repeat">
+      <a:schemeClr val="lt1">
+        <a:alpha val="90000"/>
+        <a:tint val="40000"/>
+      </a:schemeClr>
+    </dgm:fillClrLst>
+    <dgm:linClrLst meth="repeat">
+      <a:schemeClr val="dk1">
+        <a:alpha val="90000"/>
+      </a:schemeClr>
+    </dgm:linClrLst>
+    <dgm:effectClrLst/>
+    <dgm:txLinClrLst/>
+    <dgm:txFillClrLst meth="repeat">
+      <a:schemeClr val="dk1"/>
+    </dgm:txFillClrLst>
+    <dgm:txEffectClrLst/>
+  </dgm:styleLbl>
+  <dgm:styleLbl name="fgAcc0">
+    <dgm:fillClrLst meth="repeat">
+      <a:schemeClr val="dk1">
+        <a:alpha val="90000"/>
+        <a:tint val="40000"/>
+      </a:schemeClr>
+    </dgm:fillClrLst>
+    <dgm:linClrLst meth="repeat">
+      <a:schemeClr val="dk1"/>
+    </dgm:linClrLst>
+    <dgm:effectClrLst/>
+    <dgm:txLinClrLst/>
+    <dgm:txFillClrLst meth="repeat">
+      <a:schemeClr val="dk1"/>
+    </dgm:txFillClrLst>
+    <dgm:txEffectClrLst/>
+  </dgm:styleLbl>
+  <dgm:styleLbl name="fgAcc2">
+    <dgm:fillClrLst meth="repeat">
+      <a:schemeClr val="dk1">
+        <a:alpha val="90000"/>
+        <a:tint val="40000"/>
+      </a:schemeClr>
+    </dgm:fillClrLst>
+    <dgm:linClrLst meth="repeat">
+      <a:schemeClr val="dk1"/>
+    </dgm:linClrLst>
+    <dgm:effectClrLst/>
+    <dgm:txLinClrLst/>
+    <dgm:txFillClrLst meth="repeat">
+      <a:schemeClr val="dk1"/>
+    </dgm:txFillClrLst>
+    <dgm:txEffectClrLst/>
+  </dgm:styleLbl>
+  <dgm:styleLbl name="fgAcc3">
+    <dgm:fillClrLst meth="repeat">
+      <a:schemeClr val="dk1">
+        <a:alpha val="90000"/>
+        <a:tint val="40000"/>
+      </a:schemeClr>
+    </dgm:fillClrLst>
+    <dgm:linClrLst meth="repeat">
+      <a:schemeClr val="dk1"/>
+    </dgm:linClrLst>
+    <dgm:effectClrLst/>
+    <dgm:txLinClrLst/>
+    <dgm:txFillClrLst meth="repeat">
+      <a:schemeClr val="dk1"/>
+    </dgm:txFillClrLst>
+    <dgm:txEffectClrLst/>
+  </dgm:styleLbl>
+  <dgm:styleLbl name="fgAcc4">
+    <dgm:fillClrLst meth="repeat">
+      <a:schemeClr val="dk1">
+        <a:alpha val="90000"/>
+        <a:tint val="40000"/>
+      </a:schemeClr>
+    </dgm:fillClrLst>
+    <dgm:linClrLst meth="repeat">
+      <a:schemeClr val="dk1"/>
+    </dgm:linClrLst>
+    <dgm:effectClrLst/>
+    <dgm:txLinClrLst/>
+    <dgm:txFillClrLst meth="repeat">
+      <a:schemeClr val="dk1"/>
+    </dgm:txFillClrLst>
+    <dgm:txEffectClrLst/>
+  </dgm:styleLbl>
+  <dgm:styleLbl name="bgShp">
+    <dgm:fillClrLst meth="repeat">
+      <a:schemeClr val="dk1">
+        <a:tint val="40000"/>
+      </a:schemeClr>
+    </dgm:fillClrLst>
+    <dgm:linClrLst meth="repeat">
+      <a:schemeClr val="dk1"/>
+    </dgm:linClrLst>
+    <dgm:effectClrLst/>
+    <dgm:txLinClrLst/>
+    <dgm:txFillClrLst meth="repeat">
+      <a:schemeClr val="dk1"/>
+    </dgm:txFillClrLst>
+    <dgm:txEffectClrLst/>
+  </dgm:styleLbl>
+  <dgm:styleLbl name="dkBgShp">
+    <dgm:fillClrLst meth="repeat">
+      <a:schemeClr val="dk1">
+        <a:shade val="80000"/>
+      </a:schemeClr>
+    </dgm:fillClrLst>
+    <dgm:linClrLst meth="repeat">
+      <a:schemeClr val="dk1"/>
+    </dgm:linClrLst>
+    <dgm:effectClrLst/>
+    <dgm:txLinClrLst/>
+    <dgm:txFillClrLst meth="repeat">
+      <a:schemeClr val="lt1"/>
+    </dgm:txFillClrLst>
+    <dgm:txEffectClrLst/>
+  </dgm:styleLbl>
+  <dgm:styleLbl name="trBgShp">
+    <dgm:fillClrLst meth="repeat">
+      <a:schemeClr val="dk1">
+        <a:tint val="50000"/>
+        <a:alpha val="40000"/>
+      </a:schemeClr>
+    </dgm:fillClrLst>
+    <dgm:linClrLst meth="repeat">
+      <a:schemeClr val="dk1"/>
+    </dgm:linClrLst>
+    <dgm:effectClrLst/>
+    <dgm:txLinClrLst/>
+    <dgm:txFillClrLst meth="repeat">
+      <a:schemeClr val="lt1"/>
+    </dgm:txFillClrLst>
+    <dgm:txEffectClrLst/>
+  </dgm:styleLbl>
+  <dgm:styleLbl name="fgShp">
+    <dgm:fillClrLst meth="repeat">
+      <a:schemeClr val="dk1">
+        <a:tint val="60000"/>
+      </a:schemeClr>
+    </dgm:fillClrLst>
+    <dgm:linClrLst meth="repeat">
+      <a:schemeClr val="lt1"/>
+    </dgm:linClrLst>
+    <dgm:effectClrLst/>
+    <dgm:txLinClrLst/>
+    <dgm:txFillClrLst meth="repeat">
+      <a:schemeClr val="dk1"/>
+    </dgm:txFillClrLst>
+    <dgm:txEffectClrLst/>
+  </dgm:styleLbl>
+  <dgm:styleLbl name="revTx">
+    <dgm:fillClrLst meth="repeat">
+      <a:schemeClr val="lt1">
+        <a:alpha val="0"/>
+      </a:schemeClr>
+    </dgm:fillClrLst>
+    <dgm:linClrLst meth="repeat">
+      <a:schemeClr val="dk1">
+        <a:alpha val="0"/>
+      </a:schemeClr>
+    </dgm:linClrLst>
+    <dgm:effectClrLst/>
+    <dgm:txLinClrLst/>
+    <dgm:txFillClrLst meth="repeat">
+      <a:schemeClr val="tx1"/>
+    </dgm:txFillClrLst>
+    <dgm:txEffectClrLst/>
+  </dgm:styleLbl>
+</dgm:colorsDef>
+</file>
+
+<file path=ppt/diagrams/data1.xml><?xml version="1.0" encoding="utf-8"?>
+<dgm:dataModel xmlns:dgm="http://schemas.openxmlformats.org/drawingml/2006/diagram" xmlns:a="http://schemas.openxmlformats.org/drawingml/2006/main">
+  <dgm:ptLst>
+    <dgm:pt modelId="{7BAD4550-DE82-455D-A736-0BF6C0BF1BBE}" type="doc">
+      <dgm:prSet loTypeId="urn:microsoft.com/office/officeart/2005/8/layout/hProcess9" loCatId="process" qsTypeId="urn:microsoft.com/office/officeart/2005/8/quickstyle/simple1" qsCatId="simple" csTypeId="urn:microsoft.com/office/officeart/2005/8/colors/accent0_1" csCatId="mainScheme" phldr="1"/>
+      <dgm:spPr/>
+    </dgm:pt>
+    <dgm:pt modelId="{39EC9ED5-D9CF-45B7-9D5A-E054FD4F7602}">
+      <dgm:prSet phldrT="[Text]"/>
+      <dgm:spPr/>
+      <dgm:t>
+        <a:bodyPr/>
+        <a:lstStyle/>
+        <a:p>
+          <a:r>
+            <a:rPr lang="en-CA" dirty="0"/>
+            <a:t>Exploring DATA to find what is important to our topic of Tornadoes.</a:t>
+          </a:r>
+        </a:p>
+      </dgm:t>
+    </dgm:pt>
+    <dgm:pt modelId="{12DBD958-CC1E-4415-AECF-98758A46DB61}" type="parTrans" cxnId="{10B6F06D-125A-410C-A08E-87B1F55B6671}">
+      <dgm:prSet/>
+      <dgm:spPr/>
+      <dgm:t>
+        <a:bodyPr/>
+        <a:lstStyle/>
+        <a:p>
+          <a:endParaRPr lang="en-CA"/>
+        </a:p>
+      </dgm:t>
+    </dgm:pt>
+    <dgm:pt modelId="{7D63C99F-1125-4FD8-9853-2DC2F39250FD}" type="sibTrans" cxnId="{10B6F06D-125A-410C-A08E-87B1F55B6671}">
+      <dgm:prSet/>
+      <dgm:spPr/>
+      <dgm:t>
+        <a:bodyPr/>
+        <a:lstStyle/>
+        <a:p>
+          <a:endParaRPr lang="en-CA"/>
+        </a:p>
+      </dgm:t>
+    </dgm:pt>
+    <dgm:pt modelId="{AFD3AD61-9D0D-418D-9541-0AF62B03A41F}">
+      <dgm:prSet phldrT="[Text]"/>
+      <dgm:spPr/>
+      <dgm:t>
+        <a:bodyPr/>
+        <a:lstStyle/>
+        <a:p>
+          <a:r>
+            <a:rPr lang="en-CA" dirty="0"/>
+            <a:t>Extracting the:</a:t>
+          </a:r>
+        </a:p>
+        <a:p>
+          <a:r>
+            <a:rPr lang="en-CA" dirty="0"/>
+            <a:t>WHERE,</a:t>
+          </a:r>
+        </a:p>
+        <a:p>
+          <a:r>
+            <a:rPr lang="en-CA" dirty="0"/>
+            <a:t>WHEN,</a:t>
+          </a:r>
+        </a:p>
+        <a:p>
+          <a:r>
+            <a:rPr lang="en-CA" dirty="0"/>
+            <a:t>WHAT,</a:t>
+          </a:r>
+        </a:p>
+        <a:p>
+          <a:r>
+            <a:rPr lang="en-CA" dirty="0"/>
+            <a:t>HOW.</a:t>
+          </a:r>
+        </a:p>
+      </dgm:t>
+    </dgm:pt>
+    <dgm:pt modelId="{70D605FE-36CE-4C9A-A61B-465BD33B8AAC}" type="parTrans" cxnId="{533CA564-BAAF-48D0-9B99-98D0ACD30B7E}">
+      <dgm:prSet/>
+      <dgm:spPr/>
+      <dgm:t>
+        <a:bodyPr/>
+        <a:lstStyle/>
+        <a:p>
+          <a:endParaRPr lang="en-CA"/>
+        </a:p>
+      </dgm:t>
+    </dgm:pt>
+    <dgm:pt modelId="{4024625E-0956-41D2-AF96-15CC9E2A1724}" type="sibTrans" cxnId="{533CA564-BAAF-48D0-9B99-98D0ACD30B7E}">
+      <dgm:prSet/>
+      <dgm:spPr/>
+      <dgm:t>
+        <a:bodyPr/>
+        <a:lstStyle/>
+        <a:p>
+          <a:endParaRPr lang="en-CA"/>
+        </a:p>
+      </dgm:t>
+    </dgm:pt>
+    <dgm:pt modelId="{08731A95-D509-4F87-B99E-DA7BE80C0616}">
+      <dgm:prSet phldrT="[Text]"/>
+      <dgm:spPr/>
+      <dgm:t>
+        <a:bodyPr/>
+        <a:lstStyle/>
+        <a:p>
+          <a:r>
+            <a:rPr lang="en-CA" dirty="0"/>
+            <a:t>Coding in JS to Visualize the most efficient communication method using LEAFLET, DS, HTML.</a:t>
+          </a:r>
+        </a:p>
+      </dgm:t>
+    </dgm:pt>
+    <dgm:pt modelId="{A839C03C-6F5E-491E-BA45-E931D9E8F4FE}" type="parTrans" cxnId="{EDF6885F-32F4-4B6A-9E64-F1CFCE38EB04}">
+      <dgm:prSet/>
+      <dgm:spPr/>
+      <dgm:t>
+        <a:bodyPr/>
+        <a:lstStyle/>
+        <a:p>
+          <a:endParaRPr lang="en-CA"/>
+        </a:p>
+      </dgm:t>
+    </dgm:pt>
+    <dgm:pt modelId="{1E935297-81AF-481C-8654-7EAB90AC80A4}" type="sibTrans" cxnId="{EDF6885F-32F4-4B6A-9E64-F1CFCE38EB04}">
+      <dgm:prSet/>
+      <dgm:spPr/>
+      <dgm:t>
+        <a:bodyPr/>
+        <a:lstStyle/>
+        <a:p>
+          <a:endParaRPr lang="en-CA"/>
+        </a:p>
+      </dgm:t>
+    </dgm:pt>
+    <dgm:pt modelId="{4ED8AA28-10CB-45F4-ABBB-E55EEAAB574F}">
+      <dgm:prSet phldrT="[Text]"/>
+      <dgm:spPr/>
+      <dgm:t>
+        <a:bodyPr/>
+        <a:lstStyle/>
+        <a:p>
+          <a:r>
+            <a:rPr lang="en-CA" dirty="0"/>
+            <a:t>Testing EVERY step of coding. Testing for EASE of USE along the way.</a:t>
+          </a:r>
+        </a:p>
+      </dgm:t>
+    </dgm:pt>
+    <dgm:pt modelId="{3D099D45-5F35-4200-A2E6-45F6AD0B0A75}" type="parTrans" cxnId="{5A8DCBD0-5398-48D8-9510-F8839BDBD4E3}">
+      <dgm:prSet/>
+      <dgm:spPr/>
+      <dgm:t>
+        <a:bodyPr/>
+        <a:lstStyle/>
+        <a:p>
+          <a:endParaRPr lang="en-CA"/>
+        </a:p>
+      </dgm:t>
+    </dgm:pt>
+    <dgm:pt modelId="{77D741B3-7891-41BC-8354-3BBB43A979E5}" type="sibTrans" cxnId="{5A8DCBD0-5398-48D8-9510-F8839BDBD4E3}">
+      <dgm:prSet/>
+      <dgm:spPr/>
+      <dgm:t>
+        <a:bodyPr/>
+        <a:lstStyle/>
+        <a:p>
+          <a:endParaRPr lang="en-CA"/>
+        </a:p>
+      </dgm:t>
+    </dgm:pt>
+    <dgm:pt modelId="{9421328F-9A4D-4A54-AE6E-6CA58C2E1D84}">
+      <dgm:prSet phldrT="[Text]"/>
+      <dgm:spPr/>
+      <dgm:t>
+        <a:bodyPr/>
+        <a:lstStyle/>
+        <a:p>
+          <a:r>
+            <a:rPr lang="en-CA" dirty="0"/>
+            <a:t>Being Happy with a Final </a:t>
+          </a:r>
+          <a:r>
+            <a:rPr lang="en-CA"/>
+            <a:t>Product for the </a:t>
+          </a:r>
+          <a:r>
+            <a:rPr lang="en-CA" dirty="0"/>
+            <a:t>END USER.</a:t>
+          </a:r>
+        </a:p>
+      </dgm:t>
+    </dgm:pt>
+    <dgm:pt modelId="{DBF01968-C331-4B74-96A2-E7B1E3B1AE4D}" type="parTrans" cxnId="{5C24CDC0-D5B3-4FE0-9422-7B8DD5C60A8F}">
+      <dgm:prSet/>
+      <dgm:spPr/>
+      <dgm:t>
+        <a:bodyPr/>
+        <a:lstStyle/>
+        <a:p>
+          <a:endParaRPr lang="en-CA"/>
+        </a:p>
+      </dgm:t>
+    </dgm:pt>
+    <dgm:pt modelId="{D9238B4B-DE38-4D9D-A988-63417A795A2D}" type="sibTrans" cxnId="{5C24CDC0-D5B3-4FE0-9422-7B8DD5C60A8F}">
+      <dgm:prSet/>
+      <dgm:spPr/>
+      <dgm:t>
+        <a:bodyPr/>
+        <a:lstStyle/>
+        <a:p>
+          <a:endParaRPr lang="en-CA"/>
+        </a:p>
+      </dgm:t>
+    </dgm:pt>
+    <dgm:pt modelId="{B75D0606-BC72-4131-A782-8E9A2892E91F}" type="pres">
+      <dgm:prSet presAssocID="{7BAD4550-DE82-455D-A736-0BF6C0BF1BBE}" presName="CompostProcess" presStyleCnt="0">
+        <dgm:presLayoutVars>
+          <dgm:dir/>
+          <dgm:resizeHandles val="exact"/>
+        </dgm:presLayoutVars>
+      </dgm:prSet>
+      <dgm:spPr/>
+    </dgm:pt>
+    <dgm:pt modelId="{A3F94B76-FA67-4ADE-95BD-6ABE6D47172A}" type="pres">
+      <dgm:prSet presAssocID="{7BAD4550-DE82-455D-A736-0BF6C0BF1BBE}" presName="arrow" presStyleLbl="bgShp" presStyleIdx="0" presStyleCnt="1" custScaleX="117647" custLinFactNeighborX="-3236" custLinFactNeighborY="-1559"/>
+      <dgm:spPr/>
+    </dgm:pt>
+    <dgm:pt modelId="{F0577352-69E1-408D-9079-1791E614424D}" type="pres">
+      <dgm:prSet presAssocID="{7BAD4550-DE82-455D-A736-0BF6C0BF1BBE}" presName="linearProcess" presStyleCnt="0"/>
+      <dgm:spPr/>
+    </dgm:pt>
+    <dgm:pt modelId="{5C01DD5E-C125-4390-A175-556ACA83FC9D}" type="pres">
+      <dgm:prSet presAssocID="{39EC9ED5-D9CF-45B7-9D5A-E054FD4F7602}" presName="textNode" presStyleLbl="node1" presStyleIdx="0" presStyleCnt="5" custScaleX="58228" custLinFactNeighborX="-88468" custLinFactNeighborY="0">
+        <dgm:presLayoutVars>
+          <dgm:bulletEnabled val="1"/>
+        </dgm:presLayoutVars>
+      </dgm:prSet>
+      <dgm:spPr/>
+    </dgm:pt>
+    <dgm:pt modelId="{5A6DFD35-ED35-459E-B134-41DD1E05D840}" type="pres">
+      <dgm:prSet presAssocID="{7D63C99F-1125-4FD8-9853-2DC2F39250FD}" presName="sibTrans" presStyleCnt="0"/>
+      <dgm:spPr/>
+    </dgm:pt>
+    <dgm:pt modelId="{59B5D7BE-85E9-4B88-B3B3-11F44268252E}" type="pres">
+      <dgm:prSet presAssocID="{AFD3AD61-9D0D-418D-9541-0AF62B03A41F}" presName="textNode" presStyleLbl="node1" presStyleIdx="1" presStyleCnt="5" custScaleX="58228" custLinFactNeighborX="-62084">
+        <dgm:presLayoutVars>
+          <dgm:bulletEnabled val="1"/>
+        </dgm:presLayoutVars>
+      </dgm:prSet>
+      <dgm:spPr/>
+    </dgm:pt>
+    <dgm:pt modelId="{FC5A5E5B-E291-4AD5-9B9A-38F551019ABB}" type="pres">
+      <dgm:prSet presAssocID="{4024625E-0956-41D2-AF96-15CC9E2A1724}" presName="sibTrans" presStyleCnt="0"/>
+      <dgm:spPr/>
+    </dgm:pt>
+    <dgm:pt modelId="{51FCE1AD-1B26-4EC0-9D68-9A6632790E52}" type="pres">
+      <dgm:prSet presAssocID="{9421328F-9A4D-4A54-AE6E-6CA58C2E1D84}" presName="textNode" presStyleLbl="node1" presStyleIdx="2" presStyleCnt="5" custScaleX="58228" custLinFactX="103886" custLinFactNeighborX="200000" custLinFactNeighborY="0">
+        <dgm:presLayoutVars>
+          <dgm:bulletEnabled val="1"/>
+        </dgm:presLayoutVars>
+      </dgm:prSet>
+      <dgm:spPr/>
+    </dgm:pt>
+    <dgm:pt modelId="{DB2CCC46-D2D4-43C3-8E8B-12AF5BFDE16C}" type="pres">
+      <dgm:prSet presAssocID="{D9238B4B-DE38-4D9D-A988-63417A795A2D}" presName="sibTrans" presStyleCnt="0"/>
+      <dgm:spPr/>
+    </dgm:pt>
+    <dgm:pt modelId="{4EF38C47-CB8E-4B8F-8740-4655300F44FF}" type="pres">
+      <dgm:prSet presAssocID="{08731A95-D509-4F87-B99E-DA7BE80C0616}" presName="textNode" presStyleLbl="node1" presStyleIdx="3" presStyleCnt="5" custScaleX="58228" custLinFactX="-64381" custLinFactNeighborX="-100000">
+        <dgm:presLayoutVars>
+          <dgm:bulletEnabled val="1"/>
+        </dgm:presLayoutVars>
+      </dgm:prSet>
+      <dgm:spPr/>
+    </dgm:pt>
+    <dgm:pt modelId="{2CE62251-5904-4956-A0DF-0F985574BFED}" type="pres">
+      <dgm:prSet presAssocID="{1E935297-81AF-481C-8654-7EAB90AC80A4}" presName="sibTrans" presStyleCnt="0"/>
+      <dgm:spPr/>
+    </dgm:pt>
+    <dgm:pt modelId="{7F397ECD-6B90-4F48-AF2D-02D6F6E1322D}" type="pres">
+      <dgm:prSet presAssocID="{4ED8AA28-10CB-45F4-ABBB-E55EEAAB574F}" presName="textNode" presStyleLbl="node1" presStyleIdx="4" presStyleCnt="5" custScaleX="58323" custLinFactX="-67435" custLinFactNeighborX="-100000">
+        <dgm:presLayoutVars>
+          <dgm:bulletEnabled val="1"/>
+        </dgm:presLayoutVars>
+      </dgm:prSet>
+      <dgm:spPr/>
+    </dgm:pt>
+  </dgm:ptLst>
+  <dgm:cxnLst>
+    <dgm:cxn modelId="{F228D122-4AF5-4E86-8498-257E1CCAF124}" type="presOf" srcId="{7BAD4550-DE82-455D-A736-0BF6C0BF1BBE}" destId="{B75D0606-BC72-4131-A782-8E9A2892E91F}" srcOrd="0" destOrd="0" presId="urn:microsoft.com/office/officeart/2005/8/layout/hProcess9"/>
+    <dgm:cxn modelId="{EDF6885F-32F4-4B6A-9E64-F1CFCE38EB04}" srcId="{7BAD4550-DE82-455D-A736-0BF6C0BF1BBE}" destId="{08731A95-D509-4F87-B99E-DA7BE80C0616}" srcOrd="3" destOrd="0" parTransId="{A839C03C-6F5E-491E-BA45-E931D9E8F4FE}" sibTransId="{1E935297-81AF-481C-8654-7EAB90AC80A4}"/>
+    <dgm:cxn modelId="{533CA564-BAAF-48D0-9B99-98D0ACD30B7E}" srcId="{7BAD4550-DE82-455D-A736-0BF6C0BF1BBE}" destId="{AFD3AD61-9D0D-418D-9541-0AF62B03A41F}" srcOrd="1" destOrd="0" parTransId="{70D605FE-36CE-4C9A-A61B-465BD33B8AAC}" sibTransId="{4024625E-0956-41D2-AF96-15CC9E2A1724}"/>
+    <dgm:cxn modelId="{10B6F06D-125A-410C-A08E-87B1F55B6671}" srcId="{7BAD4550-DE82-455D-A736-0BF6C0BF1BBE}" destId="{39EC9ED5-D9CF-45B7-9D5A-E054FD4F7602}" srcOrd="0" destOrd="0" parTransId="{12DBD958-CC1E-4415-AECF-98758A46DB61}" sibTransId="{7D63C99F-1125-4FD8-9853-2DC2F39250FD}"/>
+    <dgm:cxn modelId="{D2D70381-93A0-4137-A0DB-550318ABBB76}" type="presOf" srcId="{4ED8AA28-10CB-45F4-ABBB-E55EEAAB574F}" destId="{7F397ECD-6B90-4F48-AF2D-02D6F6E1322D}" srcOrd="0" destOrd="0" presId="urn:microsoft.com/office/officeart/2005/8/layout/hProcess9"/>
+    <dgm:cxn modelId="{39D1A58E-A300-437B-9E69-6A712A68AE17}" type="presOf" srcId="{AFD3AD61-9D0D-418D-9541-0AF62B03A41F}" destId="{59B5D7BE-85E9-4B88-B3B3-11F44268252E}" srcOrd="0" destOrd="0" presId="urn:microsoft.com/office/officeart/2005/8/layout/hProcess9"/>
+    <dgm:cxn modelId="{40B1139C-972C-4D40-9C12-5C87A4A54506}" type="presOf" srcId="{9421328F-9A4D-4A54-AE6E-6CA58C2E1D84}" destId="{51FCE1AD-1B26-4EC0-9D68-9A6632790E52}" srcOrd="0" destOrd="0" presId="urn:microsoft.com/office/officeart/2005/8/layout/hProcess9"/>
+    <dgm:cxn modelId="{5C24CDC0-D5B3-4FE0-9422-7B8DD5C60A8F}" srcId="{7BAD4550-DE82-455D-A736-0BF6C0BF1BBE}" destId="{9421328F-9A4D-4A54-AE6E-6CA58C2E1D84}" srcOrd="2" destOrd="0" parTransId="{DBF01968-C331-4B74-96A2-E7B1E3B1AE4D}" sibTransId="{D9238B4B-DE38-4D9D-A988-63417A795A2D}"/>
+    <dgm:cxn modelId="{5A8DCBD0-5398-48D8-9510-F8839BDBD4E3}" srcId="{7BAD4550-DE82-455D-A736-0BF6C0BF1BBE}" destId="{4ED8AA28-10CB-45F4-ABBB-E55EEAAB574F}" srcOrd="4" destOrd="0" parTransId="{3D099D45-5F35-4200-A2E6-45F6AD0B0A75}" sibTransId="{77D741B3-7891-41BC-8354-3BBB43A979E5}"/>
+    <dgm:cxn modelId="{4C19AEDA-439E-41C7-9BDD-F9B4E4B849A4}" type="presOf" srcId="{39EC9ED5-D9CF-45B7-9D5A-E054FD4F7602}" destId="{5C01DD5E-C125-4390-A175-556ACA83FC9D}" srcOrd="0" destOrd="0" presId="urn:microsoft.com/office/officeart/2005/8/layout/hProcess9"/>
+    <dgm:cxn modelId="{198AB9EC-68A3-4500-B7B9-4F08B27967F5}" type="presOf" srcId="{08731A95-D509-4F87-B99E-DA7BE80C0616}" destId="{4EF38C47-CB8E-4B8F-8740-4655300F44FF}" srcOrd="0" destOrd="0" presId="urn:microsoft.com/office/officeart/2005/8/layout/hProcess9"/>
+    <dgm:cxn modelId="{77B590F2-B4EE-4D36-8EC3-9B012DBF4A84}" type="presParOf" srcId="{B75D0606-BC72-4131-A782-8E9A2892E91F}" destId="{A3F94B76-FA67-4ADE-95BD-6ABE6D47172A}" srcOrd="0" destOrd="0" presId="urn:microsoft.com/office/officeart/2005/8/layout/hProcess9"/>
+    <dgm:cxn modelId="{E7E947B6-6AC5-4A39-9801-ABB9E6A10F27}" type="presParOf" srcId="{B75D0606-BC72-4131-A782-8E9A2892E91F}" destId="{F0577352-69E1-408D-9079-1791E614424D}" srcOrd="1" destOrd="0" presId="urn:microsoft.com/office/officeart/2005/8/layout/hProcess9"/>
+    <dgm:cxn modelId="{2F32C08C-6292-4167-9886-E5A54B95DFA2}" type="presParOf" srcId="{F0577352-69E1-408D-9079-1791E614424D}" destId="{5C01DD5E-C125-4390-A175-556ACA83FC9D}" srcOrd="0" destOrd="0" presId="urn:microsoft.com/office/officeart/2005/8/layout/hProcess9"/>
+    <dgm:cxn modelId="{914574E5-538D-474E-9087-208044BAE6F0}" type="presParOf" srcId="{F0577352-69E1-408D-9079-1791E614424D}" destId="{5A6DFD35-ED35-459E-B134-41DD1E05D840}" srcOrd="1" destOrd="0" presId="urn:microsoft.com/office/officeart/2005/8/layout/hProcess9"/>
+    <dgm:cxn modelId="{449ED850-5600-4F94-AD6E-C67FBC29EF84}" type="presParOf" srcId="{F0577352-69E1-408D-9079-1791E614424D}" destId="{59B5D7BE-85E9-4B88-B3B3-11F44268252E}" srcOrd="2" destOrd="0" presId="urn:microsoft.com/office/officeart/2005/8/layout/hProcess9"/>
+    <dgm:cxn modelId="{F1B24B93-479F-459D-A07A-693B7FE84CB4}" type="presParOf" srcId="{F0577352-69E1-408D-9079-1791E614424D}" destId="{FC5A5E5B-E291-4AD5-9B9A-38F551019ABB}" srcOrd="3" destOrd="0" presId="urn:microsoft.com/office/officeart/2005/8/layout/hProcess9"/>
+    <dgm:cxn modelId="{E5294C92-09BB-414E-841C-B3E431B2E5C4}" type="presParOf" srcId="{F0577352-69E1-408D-9079-1791E614424D}" destId="{51FCE1AD-1B26-4EC0-9D68-9A6632790E52}" srcOrd="4" destOrd="0" presId="urn:microsoft.com/office/officeart/2005/8/layout/hProcess9"/>
+    <dgm:cxn modelId="{71477E21-D7D8-4095-B504-B7291109882C}" type="presParOf" srcId="{F0577352-69E1-408D-9079-1791E614424D}" destId="{DB2CCC46-D2D4-43C3-8E8B-12AF5BFDE16C}" srcOrd="5" destOrd="0" presId="urn:microsoft.com/office/officeart/2005/8/layout/hProcess9"/>
+    <dgm:cxn modelId="{5F241D6B-7D6D-4B85-8CE4-149281C311EB}" type="presParOf" srcId="{F0577352-69E1-408D-9079-1791E614424D}" destId="{4EF38C47-CB8E-4B8F-8740-4655300F44FF}" srcOrd="6" destOrd="0" presId="urn:microsoft.com/office/officeart/2005/8/layout/hProcess9"/>
+    <dgm:cxn modelId="{75EE65AC-F4BB-401F-8A53-52D839D81067}" type="presParOf" srcId="{F0577352-69E1-408D-9079-1791E614424D}" destId="{2CE62251-5904-4956-A0DF-0F985574BFED}" srcOrd="7" destOrd="0" presId="urn:microsoft.com/office/officeart/2005/8/layout/hProcess9"/>
+    <dgm:cxn modelId="{72371638-0FCA-45F7-90E2-3BB83FBC3BF1}" type="presParOf" srcId="{F0577352-69E1-408D-9079-1791E614424D}" destId="{7F397ECD-6B90-4F48-AF2D-02D6F6E1322D}" srcOrd="8" destOrd="0" presId="urn:microsoft.com/office/officeart/2005/8/layout/hProcess9"/>
+  </dgm:cxnLst>
+  <dgm:bg/>
+  <dgm:whole/>
+  <dgm:extLst>
+    <a:ext uri="http://schemas.microsoft.com/office/drawing/2008/diagram">
+      <dsp:dataModelExt xmlns:dsp="http://schemas.microsoft.com/office/drawing/2008/diagram" relId="rId6" minVer="http://schemas.openxmlformats.org/drawingml/2006/diagram"/>
+    </a:ext>
+  </dgm:extLst>
+</dgm:dataModel>
+</file>
+
+<file path=ppt/diagrams/drawing1.xml><?xml version="1.0" encoding="utf-8"?>
+<dsp:drawing xmlns:dgm="http://schemas.openxmlformats.org/drawingml/2006/diagram" xmlns:dsp="http://schemas.microsoft.com/office/drawing/2008/diagram" xmlns:a="http://schemas.openxmlformats.org/drawingml/2006/main">
+  <dsp:spTree>
+    <dsp:nvGrpSpPr>
+      <dsp:cNvPr id="0" name=""/>
+      <dsp:cNvGrpSpPr/>
+    </dsp:nvGrpSpPr>
+    <dsp:grpSpPr/>
+    <dsp:sp modelId="{A3F94B76-FA67-4ADE-95BD-6ABE6D47172A}">
+      <dsp:nvSpPr>
+        <dsp:cNvPr id="0" name=""/>
+        <dsp:cNvSpPr/>
+      </dsp:nvSpPr>
+      <dsp:spPr>
+        <a:xfrm>
+          <a:off x="0" y="0"/>
+          <a:ext cx="8568947" cy="4752528"/>
+        </a:xfrm>
+        <a:prstGeom prst="rightArrow">
+          <a:avLst/>
+        </a:prstGeom>
+        <a:solidFill>
+          <a:schemeClr val="dk1">
+            <a:tint val="40000"/>
+            <a:hueOff val="0"/>
+            <a:satOff val="0"/>
+            <a:lumOff val="0"/>
+            <a:alphaOff val="0"/>
+          </a:schemeClr>
+        </a:solidFill>
+        <a:ln>
+          <a:noFill/>
+        </a:ln>
+        <a:effectLst/>
+      </dsp:spPr>
+      <dsp:style>
+        <a:lnRef idx="0">
+          <a:scrgbClr r="0" g="0" b="0"/>
+        </a:lnRef>
+        <a:fillRef idx="1">
+          <a:scrgbClr r="0" g="0" b="0"/>
+        </a:fillRef>
+        <a:effectRef idx="0">
+          <a:scrgbClr r="0" g="0" b="0"/>
+        </a:effectRef>
+        <a:fontRef idx="minor"/>
+      </dsp:style>
+    </dsp:sp>
+    <dsp:sp modelId="{5C01DD5E-C125-4390-A175-556ACA83FC9D}">
+      <dsp:nvSpPr>
+        <dsp:cNvPr id="0" name=""/>
+        <dsp:cNvSpPr/>
+      </dsp:nvSpPr>
+      <dsp:spPr>
+        <a:xfrm>
+          <a:off x="0" y="1425758"/>
+          <a:ext cx="1602868" cy="1901011"/>
+        </a:xfrm>
+        <a:prstGeom prst="roundRect">
+          <a:avLst/>
+        </a:prstGeom>
+        <a:solidFill>
+          <a:schemeClr val="lt1">
+            <a:hueOff val="0"/>
+            <a:satOff val="0"/>
+            <a:lumOff val="0"/>
+            <a:alphaOff val="0"/>
+          </a:schemeClr>
+        </a:solidFill>
+        <a:ln w="25400" cap="flat" cmpd="sng" algn="ctr">
+          <a:solidFill>
+            <a:schemeClr val="dk1">
+              <a:shade val="80000"/>
+              <a:hueOff val="0"/>
+              <a:satOff val="0"/>
+              <a:lumOff val="0"/>
+              <a:alphaOff val="0"/>
+            </a:schemeClr>
+          </a:solidFill>
+          <a:prstDash val="solid"/>
+        </a:ln>
+        <a:effectLst/>
+      </dsp:spPr>
+      <dsp:style>
+        <a:lnRef idx="2">
+          <a:scrgbClr r="0" g="0" b="0"/>
+        </a:lnRef>
+        <a:fillRef idx="1">
+          <a:scrgbClr r="0" g="0" b="0"/>
+        </a:fillRef>
+        <a:effectRef idx="0">
+          <a:scrgbClr r="0" g="0" b="0"/>
+        </a:effectRef>
+        <a:fontRef idx="minor">
+          <a:schemeClr val="lt1"/>
+        </a:fontRef>
+      </dsp:style>
+      <dsp:txBody>
+        <a:bodyPr spcFirstLastPara="0" vert="horz" wrap="square" lIns="60960" tIns="60960" rIns="60960" bIns="60960" numCol="1" spcCol="1270" anchor="ctr" anchorCtr="0">
+          <a:noAutofit/>
+        </a:bodyPr>
+        <a:lstStyle/>
+        <a:p>
+          <a:pPr marL="0" lvl="0" indent="0" algn="ctr" defTabSz="711200">
+            <a:lnSpc>
+              <a:spcPct val="90000"/>
+            </a:lnSpc>
+            <a:spcBef>
+              <a:spcPct val="0"/>
+            </a:spcBef>
+            <a:spcAft>
+              <a:spcPct val="35000"/>
+            </a:spcAft>
+            <a:buNone/>
+          </a:pPr>
+          <a:r>
+            <a:rPr lang="en-CA" sz="1600" kern="1200" dirty="0"/>
+            <a:t>Exploring DATA to find what is important to our topic of Tornadoes.</a:t>
+          </a:r>
+        </a:p>
+      </dsp:txBody>
+      <dsp:txXfrm>
+        <a:off x="78246" y="1504004"/>
+        <a:ext cx="1446376" cy="1744519"/>
+      </dsp:txXfrm>
+    </dsp:sp>
+    <dsp:sp modelId="{59B5D7BE-85E9-4B88-B3B3-11F44268252E}">
+      <dsp:nvSpPr>
+        <dsp:cNvPr id="0" name=""/>
+        <dsp:cNvSpPr/>
+      </dsp:nvSpPr>
+      <dsp:spPr>
+        <a:xfrm>
+          <a:off x="1656184" y="1425758"/>
+          <a:ext cx="1602868" cy="1901011"/>
+        </a:xfrm>
+        <a:prstGeom prst="roundRect">
+          <a:avLst/>
+        </a:prstGeom>
+        <a:solidFill>
+          <a:schemeClr val="lt1">
+            <a:hueOff val="0"/>
+            <a:satOff val="0"/>
+            <a:lumOff val="0"/>
+            <a:alphaOff val="0"/>
+          </a:schemeClr>
+        </a:solidFill>
+        <a:ln w="25400" cap="flat" cmpd="sng" algn="ctr">
+          <a:solidFill>
+            <a:schemeClr val="dk1">
+              <a:shade val="80000"/>
+              <a:hueOff val="0"/>
+              <a:satOff val="0"/>
+              <a:lumOff val="0"/>
+              <a:alphaOff val="0"/>
+            </a:schemeClr>
+          </a:solidFill>
+          <a:prstDash val="solid"/>
+        </a:ln>
+        <a:effectLst/>
+      </dsp:spPr>
+      <dsp:style>
+        <a:lnRef idx="2">
+          <a:scrgbClr r="0" g="0" b="0"/>
+        </a:lnRef>
+        <a:fillRef idx="1">
+          <a:scrgbClr r="0" g="0" b="0"/>
+        </a:fillRef>
+        <a:effectRef idx="0">
+          <a:scrgbClr r="0" g="0" b="0"/>
+        </a:effectRef>
+        <a:fontRef idx="minor">
+          <a:schemeClr val="lt1"/>
+        </a:fontRef>
+      </dsp:style>
+      <dsp:txBody>
+        <a:bodyPr spcFirstLastPara="0" vert="horz" wrap="square" lIns="60960" tIns="60960" rIns="60960" bIns="60960" numCol="1" spcCol="1270" anchor="ctr" anchorCtr="0">
+          <a:noAutofit/>
+        </a:bodyPr>
+        <a:lstStyle/>
+        <a:p>
+          <a:pPr marL="0" lvl="0" indent="0" algn="ctr" defTabSz="711200">
+            <a:lnSpc>
+              <a:spcPct val="90000"/>
+            </a:lnSpc>
+            <a:spcBef>
+              <a:spcPct val="0"/>
+            </a:spcBef>
+            <a:spcAft>
+              <a:spcPct val="35000"/>
+            </a:spcAft>
+            <a:buNone/>
+          </a:pPr>
+          <a:r>
+            <a:rPr lang="en-CA" sz="1600" kern="1200" dirty="0"/>
+            <a:t>Extracting the:</a:t>
+          </a:r>
+        </a:p>
+        <a:p>
+          <a:pPr marL="0" lvl="0" indent="0" algn="ctr" defTabSz="711200">
+            <a:lnSpc>
+              <a:spcPct val="90000"/>
+            </a:lnSpc>
+            <a:spcBef>
+              <a:spcPct val="0"/>
+            </a:spcBef>
+            <a:spcAft>
+              <a:spcPct val="35000"/>
+            </a:spcAft>
+            <a:buNone/>
+          </a:pPr>
+          <a:r>
+            <a:rPr lang="en-CA" sz="1600" kern="1200" dirty="0"/>
+            <a:t>WHERE,</a:t>
+          </a:r>
+        </a:p>
+        <a:p>
+          <a:pPr marL="0" lvl="0" indent="0" algn="ctr" defTabSz="711200">
+            <a:lnSpc>
+              <a:spcPct val="90000"/>
+            </a:lnSpc>
+            <a:spcBef>
+              <a:spcPct val="0"/>
+            </a:spcBef>
+            <a:spcAft>
+              <a:spcPct val="35000"/>
+            </a:spcAft>
+            <a:buNone/>
+          </a:pPr>
+          <a:r>
+            <a:rPr lang="en-CA" sz="1600" kern="1200" dirty="0"/>
+            <a:t>WHEN,</a:t>
+          </a:r>
+        </a:p>
+        <a:p>
+          <a:pPr marL="0" lvl="0" indent="0" algn="ctr" defTabSz="711200">
+            <a:lnSpc>
+              <a:spcPct val="90000"/>
+            </a:lnSpc>
+            <a:spcBef>
+              <a:spcPct val="0"/>
+            </a:spcBef>
+            <a:spcAft>
+              <a:spcPct val="35000"/>
+            </a:spcAft>
+            <a:buNone/>
+          </a:pPr>
+          <a:r>
+            <a:rPr lang="en-CA" sz="1600" kern="1200" dirty="0"/>
+            <a:t>WHAT,</a:t>
+          </a:r>
+        </a:p>
+        <a:p>
+          <a:pPr marL="0" lvl="0" indent="0" algn="ctr" defTabSz="711200">
+            <a:lnSpc>
+              <a:spcPct val="90000"/>
+            </a:lnSpc>
+            <a:spcBef>
+              <a:spcPct val="0"/>
+            </a:spcBef>
+            <a:spcAft>
+              <a:spcPct val="35000"/>
+            </a:spcAft>
+            <a:buNone/>
+          </a:pPr>
+          <a:r>
+            <a:rPr lang="en-CA" sz="1600" kern="1200" dirty="0"/>
+            <a:t>HOW.</a:t>
+          </a:r>
+        </a:p>
+      </dsp:txBody>
+      <dsp:txXfrm>
+        <a:off x="1734430" y="1504004"/>
+        <a:ext cx="1446376" cy="1744519"/>
+      </dsp:txXfrm>
+    </dsp:sp>
+    <dsp:sp modelId="{51FCE1AD-1B26-4EC0-9D68-9A6632790E52}">
+      <dsp:nvSpPr>
+        <dsp:cNvPr id="0" name=""/>
+        <dsp:cNvSpPr/>
+      </dsp:nvSpPr>
+      <dsp:spPr>
+        <a:xfrm>
+          <a:off x="6616223" y="1425758"/>
+          <a:ext cx="1602868" cy="1901011"/>
+        </a:xfrm>
+        <a:prstGeom prst="roundRect">
+          <a:avLst/>
+        </a:prstGeom>
+        <a:solidFill>
+          <a:schemeClr val="lt1">
+            <a:hueOff val="0"/>
+            <a:satOff val="0"/>
+            <a:lumOff val="0"/>
+            <a:alphaOff val="0"/>
+          </a:schemeClr>
+        </a:solidFill>
+        <a:ln w="25400" cap="flat" cmpd="sng" algn="ctr">
+          <a:solidFill>
+            <a:schemeClr val="dk1">
+              <a:shade val="80000"/>
+              <a:hueOff val="0"/>
+              <a:satOff val="0"/>
+              <a:lumOff val="0"/>
+              <a:alphaOff val="0"/>
+            </a:schemeClr>
+          </a:solidFill>
+          <a:prstDash val="solid"/>
+        </a:ln>
+        <a:effectLst/>
+      </dsp:spPr>
+      <dsp:style>
+        <a:lnRef idx="2">
+          <a:scrgbClr r="0" g="0" b="0"/>
+        </a:lnRef>
+        <a:fillRef idx="1">
+          <a:scrgbClr r="0" g="0" b="0"/>
+        </a:fillRef>
+        <a:effectRef idx="0">
+          <a:scrgbClr r="0" g="0" b="0"/>
+        </a:effectRef>
+        <a:fontRef idx="minor">
+          <a:schemeClr val="lt1"/>
+        </a:fontRef>
+      </dsp:style>
+      <dsp:txBody>
+        <a:bodyPr spcFirstLastPara="0" vert="horz" wrap="square" lIns="60960" tIns="60960" rIns="60960" bIns="60960" numCol="1" spcCol="1270" anchor="ctr" anchorCtr="0">
+          <a:noAutofit/>
+        </a:bodyPr>
+        <a:lstStyle/>
+        <a:p>
+          <a:pPr marL="0" lvl="0" indent="0" algn="ctr" defTabSz="711200">
+            <a:lnSpc>
+              <a:spcPct val="90000"/>
+            </a:lnSpc>
+            <a:spcBef>
+              <a:spcPct val="0"/>
+            </a:spcBef>
+            <a:spcAft>
+              <a:spcPct val="35000"/>
+            </a:spcAft>
+            <a:buNone/>
+          </a:pPr>
+          <a:r>
+            <a:rPr lang="en-CA" sz="1600" kern="1200" dirty="0"/>
+            <a:t>Being Happy with a Final </a:t>
+          </a:r>
+          <a:r>
+            <a:rPr lang="en-CA" sz="1600" kern="1200"/>
+            <a:t>Product for the </a:t>
+          </a:r>
+          <a:r>
+            <a:rPr lang="en-CA" sz="1600" kern="1200" dirty="0"/>
+            <a:t>END USER.</a:t>
+          </a:r>
+        </a:p>
+      </dsp:txBody>
+      <dsp:txXfrm>
+        <a:off x="6694469" y="1504004"/>
+        <a:ext cx="1446376" cy="1744519"/>
+      </dsp:txXfrm>
+    </dsp:sp>
+    <dsp:sp modelId="{4EF38C47-CB8E-4B8F-8740-4655300F44FF}">
+      <dsp:nvSpPr>
+        <dsp:cNvPr id="0" name=""/>
+        <dsp:cNvSpPr/>
+      </dsp:nvSpPr>
+      <dsp:spPr>
+        <a:xfrm>
+          <a:off x="3312358" y="1425758"/>
+          <a:ext cx="1602868" cy="1901011"/>
+        </a:xfrm>
+        <a:prstGeom prst="roundRect">
+          <a:avLst/>
+        </a:prstGeom>
+        <a:solidFill>
+          <a:schemeClr val="lt1">
+            <a:hueOff val="0"/>
+            <a:satOff val="0"/>
+            <a:lumOff val="0"/>
+            <a:alphaOff val="0"/>
+          </a:schemeClr>
+        </a:solidFill>
+        <a:ln w="25400" cap="flat" cmpd="sng" algn="ctr">
+          <a:solidFill>
+            <a:schemeClr val="dk1">
+              <a:shade val="80000"/>
+              <a:hueOff val="0"/>
+              <a:satOff val="0"/>
+              <a:lumOff val="0"/>
+              <a:alphaOff val="0"/>
+            </a:schemeClr>
+          </a:solidFill>
+          <a:prstDash val="solid"/>
+        </a:ln>
+        <a:effectLst/>
+      </dsp:spPr>
+      <dsp:style>
+        <a:lnRef idx="2">
+          <a:scrgbClr r="0" g="0" b="0"/>
+        </a:lnRef>
+        <a:fillRef idx="1">
+          <a:scrgbClr r="0" g="0" b="0"/>
+        </a:fillRef>
+        <a:effectRef idx="0">
+          <a:scrgbClr r="0" g="0" b="0"/>
+        </a:effectRef>
+        <a:fontRef idx="minor">
+          <a:schemeClr val="lt1"/>
+        </a:fontRef>
+      </dsp:style>
+      <dsp:txBody>
+        <a:bodyPr spcFirstLastPara="0" vert="horz" wrap="square" lIns="60960" tIns="60960" rIns="60960" bIns="60960" numCol="1" spcCol="1270" anchor="ctr" anchorCtr="0">
+          <a:noAutofit/>
+        </a:bodyPr>
+        <a:lstStyle/>
+        <a:p>
+          <a:pPr marL="0" lvl="0" indent="0" algn="ctr" defTabSz="711200">
+            <a:lnSpc>
+              <a:spcPct val="90000"/>
+            </a:lnSpc>
+            <a:spcBef>
+              <a:spcPct val="0"/>
+            </a:spcBef>
+            <a:spcAft>
+              <a:spcPct val="35000"/>
+            </a:spcAft>
+            <a:buNone/>
+          </a:pPr>
+          <a:r>
+            <a:rPr lang="en-CA" sz="1600" kern="1200" dirty="0"/>
+            <a:t>Coding in JS to Visualize the most efficient communication method using LEAFLET, DS, HTML.</a:t>
+          </a:r>
+        </a:p>
+      </dsp:txBody>
+      <dsp:txXfrm>
+        <a:off x="3390604" y="1504004"/>
+        <a:ext cx="1446376" cy="1744519"/>
+      </dsp:txXfrm>
+    </dsp:sp>
+    <dsp:sp modelId="{7F397ECD-6B90-4F48-AF2D-02D6F6E1322D}">
+      <dsp:nvSpPr>
+        <dsp:cNvPr id="0" name=""/>
+        <dsp:cNvSpPr/>
+      </dsp:nvSpPr>
+      <dsp:spPr>
+        <a:xfrm>
+          <a:off x="4968543" y="1425758"/>
+          <a:ext cx="1605483" cy="1901011"/>
+        </a:xfrm>
+        <a:prstGeom prst="roundRect">
+          <a:avLst/>
+        </a:prstGeom>
+        <a:solidFill>
+          <a:schemeClr val="lt1">
+            <a:hueOff val="0"/>
+            <a:satOff val="0"/>
+            <a:lumOff val="0"/>
+            <a:alphaOff val="0"/>
+          </a:schemeClr>
+        </a:solidFill>
+        <a:ln w="25400" cap="flat" cmpd="sng" algn="ctr">
+          <a:solidFill>
+            <a:schemeClr val="dk1">
+              <a:shade val="80000"/>
+              <a:hueOff val="0"/>
+              <a:satOff val="0"/>
+              <a:lumOff val="0"/>
+              <a:alphaOff val="0"/>
+            </a:schemeClr>
+          </a:solidFill>
+          <a:prstDash val="solid"/>
+        </a:ln>
+        <a:effectLst/>
+      </dsp:spPr>
+      <dsp:style>
+        <a:lnRef idx="2">
+          <a:scrgbClr r="0" g="0" b="0"/>
+        </a:lnRef>
+        <a:fillRef idx="1">
+          <a:scrgbClr r="0" g="0" b="0"/>
+        </a:fillRef>
+        <a:effectRef idx="0">
+          <a:scrgbClr r="0" g="0" b="0"/>
+        </a:effectRef>
+        <a:fontRef idx="minor">
+          <a:schemeClr val="lt1"/>
+        </a:fontRef>
+      </dsp:style>
+      <dsp:txBody>
+        <a:bodyPr spcFirstLastPara="0" vert="horz" wrap="square" lIns="60960" tIns="60960" rIns="60960" bIns="60960" numCol="1" spcCol="1270" anchor="ctr" anchorCtr="0">
+          <a:noAutofit/>
+        </a:bodyPr>
+        <a:lstStyle/>
+        <a:p>
+          <a:pPr marL="0" lvl="0" indent="0" algn="ctr" defTabSz="711200">
+            <a:lnSpc>
+              <a:spcPct val="90000"/>
+            </a:lnSpc>
+            <a:spcBef>
+              <a:spcPct val="0"/>
+            </a:spcBef>
+            <a:spcAft>
+              <a:spcPct val="35000"/>
+            </a:spcAft>
+            <a:buNone/>
+          </a:pPr>
+          <a:r>
+            <a:rPr lang="en-CA" sz="1600" kern="1200" dirty="0"/>
+            <a:t>Testing EVERY step of coding. Testing for EASE of USE along the way.</a:t>
+          </a:r>
+        </a:p>
+      </dsp:txBody>
+      <dsp:txXfrm>
+        <a:off x="5046916" y="1504131"/>
+        <a:ext cx="1448737" cy="1744265"/>
+      </dsp:txXfrm>
+    </dsp:sp>
+  </dsp:spTree>
+</dsp:drawing>
+</file>
+
+<file path=ppt/diagrams/layout1.xml><?xml version="1.0" encoding="utf-8"?>
+<dgm:layoutDef xmlns:dgm="http://schemas.openxmlformats.org/drawingml/2006/diagram" xmlns:a="http://schemas.openxmlformats.org/drawingml/2006/main" uniqueId="urn:microsoft.com/office/officeart/2005/8/layout/hProcess9">
+  <dgm:title val=""/>
+  <dgm:desc val=""/>
+  <dgm:catLst>
+    <dgm:cat type="process" pri="5000"/>
+    <dgm:cat type="convert" pri="13000"/>
+  </dgm:catLst>
+  <dgm:sampData useDef="1">
+    <dgm:dataModel>
+      <dgm:ptLst/>
+      <dgm:bg/>
+      <dgm:whole/>
+    </dgm:dataModel>
+  </dgm:sampData>
+  <dgm:styleData>
+    <dgm:dataModel>
+      <dgm:ptLst>
+        <dgm:pt modelId="0" type="doc"/>
+        <dgm:pt modelId="1"/>
+        <dgm:pt modelId="2"/>
+      </dgm:ptLst>
+      <dgm:cxnLst>
+        <dgm:cxn modelId="3" srcId="0" destId="1" srcOrd="0" destOrd="0"/>
+        <dgm:cxn modelId="4" srcId="0" destId="2" srcOrd="1" destOrd="0"/>
+      </dgm:cxnLst>
+      <dgm:bg/>
+      <dgm:whole/>
+    </dgm:dataModel>
+  </dgm:styleData>
+  <dgm:clrData>
+    <dgm:dataModel>
+      <dgm:ptLst>
+        <dgm:pt modelId="0" type="doc"/>
+        <dgm:pt modelId="1"/>
+        <dgm:pt modelId="2"/>
+        <dgm:pt modelId="3"/>
+        <dgm:pt modelId="4"/>
+      </dgm:ptLst>
+      <dgm:cxnLst>
+        <dgm:cxn modelId="5" srcId="0" destId="1" srcOrd="0" destOrd="0"/>
+        <dgm:cxn modelId="6" srcId="0" destId="2" srcOrd="1" destOrd="0"/>
+        <dgm:cxn modelId="7" srcId="0" destId="3" srcOrd="2" destOrd="0"/>
+        <dgm:cxn modelId="8" srcId="0" destId="4" srcOrd="3" destOrd="0"/>
+      </dgm:cxnLst>
+      <dgm:bg/>
+      <dgm:whole/>
+    </dgm:dataModel>
+  </dgm:clrData>
+  <dgm:layoutNode name="CompostProcess">
+    <dgm:varLst>
+      <dgm:dir/>
+      <dgm:resizeHandles val="exact"/>
+    </dgm:varLst>
+    <dgm:alg type="composite">
+      <dgm:param type="horzAlign" val="ctr"/>
+      <dgm:param type="vertAlign" val="mid"/>
+    </dgm:alg>
+    <dgm:shape xmlns:r="http://schemas.openxmlformats.org/officeDocument/2006/relationships" r:blip="">
+      <dgm:adjLst/>
+    </dgm:shape>
+    <dgm:presOf/>
+    <dgm:constrLst>
+      <dgm:constr type="w" for="ch" forName="arrow" refType="w" fact="0.85"/>
+      <dgm:constr type="h" for="ch" forName="arrow" refType="h"/>
+      <dgm:constr type="ctrX" for="ch" forName="arrow" refType="w" fact="0.5"/>
+      <dgm:constr type="ctrY" for="ch" forName="arrow" refType="h" fact="0.5"/>
+      <dgm:constr type="w" for="ch" forName="linearProcess" refType="w"/>
+      <dgm:constr type="h" for="ch" forName="linearProcess" refType="h" fact="0.4"/>
+      <dgm:constr type="ctrX" for="ch" forName="linearProcess" refType="w" fact="0.5"/>
+      <dgm:constr type="ctrY" for="ch" forName="linearProcess" refType="h" fact="0.5"/>
+    </dgm:constrLst>
+    <dgm:ruleLst/>
+    <dgm:layoutNode name="arrow" styleLbl="bgShp">
+      <dgm:alg type="sp"/>
+      <dgm:choose name="Name0">
+        <dgm:if name="Name1" func="var" arg="dir" op="equ" val="norm">
+          <dgm:shape xmlns:r="http://schemas.openxmlformats.org/officeDocument/2006/relationships" type="rightArrow" r:blip="">
+            <dgm:adjLst/>
+          </dgm:shape>
+        </dgm:if>
+        <dgm:else name="Name2">
+          <dgm:shape xmlns:r="http://schemas.openxmlformats.org/officeDocument/2006/relationships" type="leftArrow" r:blip="">
+            <dgm:adjLst/>
+          </dgm:shape>
+        </dgm:else>
+      </dgm:choose>
+      <dgm:presOf/>
+      <dgm:constrLst/>
+      <dgm:ruleLst/>
+    </dgm:layoutNode>
+    <dgm:layoutNode name="linearProcess">
+      <dgm:choose name="Name3">
+        <dgm:if name="Name4" func="var" arg="dir" op="equ" val="norm">
+          <dgm:alg type="lin"/>
+        </dgm:if>
+        <dgm:else name="Name5">
+          <dgm:alg type="lin">
+            <dgm:param type="linDir" val="fromR"/>
+          </dgm:alg>
+        </dgm:else>
+      </dgm:choose>
+      <dgm:shape xmlns:r="http://schemas.openxmlformats.org/officeDocument/2006/relationships" r:blip="">
+        <dgm:adjLst/>
+      </dgm:shape>
+      <dgm:presOf/>
+      <dgm:constrLst>
+        <dgm:constr type="userA" for="ch" ptType="node" refType="w"/>
+        <dgm:constr type="h" for="ch" ptType="node" refType="h"/>
+        <dgm:constr type="w" for="ch" ptType="node" op="equ"/>
+        <dgm:constr type="w" for="ch" forName="sibTrans" refType="w" fact="0.05"/>
+        <dgm:constr type="primFontSz" for="ch" ptType="node" op="equ" val="65"/>
+      </dgm:constrLst>
+      <dgm:ruleLst/>
+      <dgm:forEach name="Name6" axis="ch" ptType="node">
+        <dgm:layoutNode name="textNode" styleLbl="node1">
+          <dgm:varLst>
+            <dgm:bulletEnabled val="1"/>
+          </dgm:varLst>
+          <dgm:alg type="tx"/>
+          <dgm:shape xmlns:r="http://schemas.openxmlformats.org/officeDocument/2006/relationships" type="roundRect" r:blip="">
+            <dgm:adjLst/>
+          </dgm:shape>
+          <dgm:presOf axis="desOrSelf" ptType="node"/>
+          <dgm:constrLst>
+            <dgm:constr type="userA"/>
+            <dgm:constr type="w" refType="userA" fact="0.3"/>
+            <dgm:constr type="tMarg" refType="primFontSz" fact="0.3"/>
+            <dgm:constr type="bMarg" refType="primFontSz" fact="0.3"/>
+            <dgm:constr type="lMarg" refType="primFontSz" fact="0.3"/>
+            <dgm:constr type="rMarg" refType="primFontSz" fact="0.3"/>
+          </dgm:constrLst>
+          <dgm:ruleLst>
+            <dgm:rule type="w" val="NaN" fact="1" max="NaN"/>
+            <dgm:rule type="primFontSz" val="5" fact="NaN" max="NaN"/>
+          </dgm:ruleLst>
+        </dgm:layoutNode>
+        <dgm:forEach name="Name7" axis="followSib" ptType="sibTrans" cnt="1">
+          <dgm:layoutNode name="sibTrans">
+            <dgm:alg type="sp"/>
+            <dgm:shape xmlns:r="http://schemas.openxmlformats.org/officeDocument/2006/relationships" r:blip="">
+              <dgm:adjLst/>
+            </dgm:shape>
+            <dgm:presOf/>
+            <dgm:constrLst/>
+            <dgm:ruleLst/>
+          </dgm:layoutNode>
+        </dgm:forEach>
+      </dgm:forEach>
+    </dgm:layoutNode>
+  </dgm:layoutNode>
+</dgm:layoutDef>
+</file>
+
+<file path=ppt/diagrams/quickStyle1.xml><?xml version="1.0" encoding="utf-8"?>
+<dgm:styleDef xmlns:dgm="http://schemas.openxmlformats.org/drawingml/2006/diagram" xmlns:a="http://schemas.openxmlformats.org/drawingml/2006/main" uniqueId="urn:microsoft.com/office/officeart/2005/8/quickstyle/simple1">
+  <dgm:title val=""/>
+  <dgm:desc val=""/>
+  <dgm:catLst>
+    <dgm:cat type="simple" pri="10100"/>
+  </dgm:catLst>
+  <dgm:scene3d>
+    <a:camera prst="orthographicFront"/>
+    <a:lightRig rig="threePt" dir="t"/>
+  </dgm:scene3d>
+  <dgm:styleLbl name="node0">
+    <dgm:scene3d>
+      <a:camera prst="orthographicFront"/>
+      <a:lightRig rig="threePt" dir="t"/>
+    </dgm:scene3d>
+    <dgm:sp3d/>
+    <dgm:txPr/>
+    <dgm:style>
+      <a:lnRef idx="2">
+        <a:scrgbClr r="0" g="0" b="0"/>
+      </a:lnRef>
+      <a:fillRef idx="1">
+        <a:scrgbClr r="0" g="0" b="0"/>
+      </a:fillRef>
+      <a:effectRef idx="0">
+        <a:scrgbClr r="0" g="0" b="0"/>
+      </a:effectRef>
+      <a:fontRef idx="minor">
+        <a:schemeClr val="lt1"/>
+      </a:fontRef>
+    </dgm:style>
+  </dgm:styleLbl>
+  <dgm:styleLbl name="lnNode1">
+    <dgm:scene3d>
+      <a:camera prst="orthographicFront"/>
+      <a:lightRig rig="threePt" dir="t"/>
+    </dgm:scene3d>
+    <dgm:sp3d/>
+    <dgm:txPr/>
+    <dgm:style>
+      <a:lnRef idx="2">
+        <a:scrgbClr r="0" g="0" b="0"/>
+      </a:lnRef>
+      <a:fillRef idx="1">
+        <a:scrgbClr r="0" g="0" b="0"/>
+      </a:fillRef>
+      <a:effectRef idx="0">
+        <a:scrgbClr r="0" g="0" b="0"/>
+      </a:effectRef>
+      <a:fontRef idx="minor">
+        <a:schemeClr val="lt1"/>
+      </a:fontRef>
+    </dgm:style>
+  </dgm:styleLbl>
+  <dgm:styleLbl name="vennNode1">
+    <dgm:scene3d>
+      <a:camera prst="orthographicFront"/>
+      <a:lightRig rig="threePt" dir="t"/>
+    </dgm:scene3d>
+    <dgm:sp3d/>
+    <dgm:txPr/>
+    <dgm:style>
+      <a:lnRef idx="2">
+        <a:scrgbClr r="0" g="0" b="0"/>
+      </a:lnRef>
+      <a:fillRef idx="1">
+        <a:scrgbClr r="0" g="0" b="0"/>
+      </a:fillRef>
+      <a:effectRef idx="0">
+        <a:scrgbClr r="0" g="0" b="0"/>
+      </a:effectRef>
+      <a:fontRef idx="minor">
+        <a:schemeClr val="tx1"/>
+      </a:fontRef>
+    </dgm:style>
+  </dgm:styleLbl>
+  <dgm:styleLbl name="alignNode1">
+    <dgm:scene3d>
+      <a:camera prst="orthographicFront"/>
+      <a:lightRig rig="threePt" dir="t"/>
+    </dgm:scene3d>
+    <dgm:sp3d/>
+    <dgm:txPr/>
+    <dgm:style>
+      <a:lnRef idx="2">
+        <a:scrgbClr r="0" g="0" b="0"/>
+      </a:lnRef>
+      <a:fillRef idx="1">
+        <a:scrgbClr r="0" g="0" b="0"/>
+      </a:fillRef>
+      <a:effectRef idx="0">
+        <a:scrgbClr r="0" g="0" b="0"/>
+      </a:effectRef>
+      <a:fontRef idx="minor">
+        <a:schemeClr val="lt1"/>
+      </a:fontRef>
+    </dgm:style>
+  </dgm:styleLbl>
+  <dgm:styleLbl name="node1">
+    <dgm:scene3d>
+      <a:camera prst="orthographicFront"/>
+      <a:lightRig rig="threePt" dir="t"/>
+    </dgm:scene3d>
+    <dgm:sp3d/>
+    <dgm:txPr/>
+    <dgm:style>
+      <a:lnRef idx="2">
+        <a:scrgbClr r="0" g="0" b="0"/>
+      </a:lnRef>
+      <a:fillRef idx="1">
+        <a:scrgbClr r="0" g="0" b="0"/>
+      </a:fillRef>
+      <a:effectRef idx="0">
+        <a:scrgbClr r="0" g="0" b="0"/>
+      </a:effectRef>
+      <a:fontRef idx="minor">
+        <a:schemeClr val="lt1"/>
+      </a:fontRef>
+    </dgm:style>
+  </dgm:styleLbl>
+  <dgm:styleLbl name="node2">
+    <dgm:scene3d>
+      <a:camera prst="orthographicFront"/>
+      <a:lightRig rig="threePt" dir="t"/>
+    </dgm:scene3d>
+    <dgm:sp3d/>
+    <dgm:txPr/>
+    <dgm:style>
+      <a:lnRef idx="2">
+        <a:scrgbClr r="0" g="0" b="0"/>
+      </a:lnRef>
+      <a:fillRef idx="1">
+        <a:scrgbClr r="0" g="0" b="0"/>
+      </a:fillRef>
+      <a:effectRef idx="0">
+        <a:scrgbClr r="0" g="0" b="0"/>
+      </a:effectRef>
+      <a:fontRef idx="minor">
+        <a:schemeClr val="lt1"/>
+      </a:fontRef>
+    </dgm:style>
+  </dgm:styleLbl>
+  <dgm:styleLbl name="node3">
+    <dgm:scene3d>
+      <a:camera prst="orthographicFront"/>
+      <a:lightRig rig="threePt" dir="t"/>
+    </dgm:scene3d>
+    <dgm:sp3d/>
+    <dgm:txPr/>
+    <dgm:style>
+      <a:lnRef idx="2">
+        <a:scrgbClr r="0" g="0" b="0"/>
+      </a:lnRef>
+      <a:fillRef idx="1">
+        <a:scrgbClr r="0" g="0" b="0"/>
+      </a:fillRef>
+      <a:effectRef idx="0">
+        <a:scrgbClr r="0" g="0" b="0"/>
+      </a:effectRef>
+      <a:fontRef idx="minor">
+        <a:schemeClr val="lt1"/>
+      </a:fontRef>
+    </dgm:style>
+  </dgm:styleLbl>
+  <dgm:styleLbl name="node4">
+    <dgm:scene3d>
+      <a:camera prst="orthographicFront"/>
+      <a:lightRig rig="threePt" dir="t"/>
+    </dgm:scene3d>
+    <dgm:sp3d/>
+    <dgm:txPr/>
+    <dgm:style>
+      <a:lnRef idx="2">
+        <a:scrgbClr r="0" g="0" b="0"/>
+      </a:lnRef>
+      <a:fillRef idx="1">
+        <a:scrgbClr r="0" g="0" b="0"/>
+      </a:fillRef>
+      <a:effectRef idx="0">
+        <a:scrgbClr r="0" g="0" b="0"/>
+      </a:effectRef>
+      <a:fontRef idx="minor">
+        <a:schemeClr val="lt1"/>
+      </a:fontRef>
+    </dgm:style>
+  </dgm:styleLbl>
+  <dgm:styleLbl name="fgImgPlace1">
+    <dgm:scene3d>
+      <a:camera prst="orthographicFront"/>
+      <a:lightRig rig="threePt" dir="t"/>
+    </dgm:scene3d>
+    <dgm:sp3d/>
+    <dgm:txPr/>
+    <dgm:style>
+      <a:lnRef idx="2">
+        <a:scrgbClr r="0" g="0" b="0"/>
+      </a:lnRef>
+      <a:fillRef idx="1">
+        <a:scrgbClr r="0" g="0" b="0"/>
+      </a:fillRef>
+      <a:effectRef idx="0">
+        <a:scrgbClr r="0" g="0" b="0"/>
+      </a:effectRef>
+      <a:fontRef idx="minor"/>
+    </dgm:style>
+  </dgm:styleLbl>
+  <dgm:styleLbl name="alignImgPlace1">
+    <dgm:scene3d>
+      <a:camera prst="orthographicFront"/>
+      <a:lightRig rig="threePt" dir="t"/>
+    </dgm:scene3d>
+    <dgm:sp3d/>
+    <dgm:txPr/>
+    <dgm:style>
+      <a:lnRef idx="2">
+        <a:scrgbClr r="0" g="0" b="0"/>
+      </a:lnRef>
+      <a:fillRef idx="1">
+        <a:scrgbClr r="0" g="0" b="0"/>
+      </a:fillRef>
+      <a:effectRef idx="0">
+        <a:scrgbClr r="0" g="0" b="0"/>
+      </a:effectRef>
+      <a:fontRef idx="minor"/>
+    </dgm:style>
+  </dgm:styleLbl>
+  <dgm:styleLbl name="bgImgPlace1">
+    <dgm:scene3d>
+      <a:camera prst="orthographicFront"/>
+      <a:lightRig rig="threePt" dir="t"/>
+    </dgm:scene3d>
+    <dgm:sp3d/>
+    <dgm:txPr/>
+    <dgm:style>
+      <a:lnRef idx="2">
+        <a:scrgbClr r="0" g="0" b="0"/>
+      </a:lnRef>
+      <a:fillRef idx="1">
+        <a:scrgbClr r="0" g="0" b="0"/>
+      </a:fillRef>
+      <a:effectRef idx="0">
+        <a:scrgbClr r="0" g="0" b="0"/>
+      </a:effectRef>
+      <a:fontRef idx="minor"/>
+    </dgm:style>
+  </dgm:styleLbl>
+  <dgm:styleLbl name="sibTrans2D1">
+    <dgm:scene3d>
+      <a:camera prst="orthographicFront"/>
+      <a:lightRig rig="threePt" dir="t"/>
+    </dgm:scene3d>
+    <dgm:sp3d/>
+    <dgm:txPr/>
+    <dgm:style>
+      <a:lnRef idx="0">
+        <a:scrgbClr r="0" g="0" b="0"/>
+      </a:lnRef>
+      <a:fillRef idx="1">
+        <a:scrgbClr r="0" g="0" b="0"/>
+      </a:fillRef>
+      <a:effectRef idx="0">
+        <a:scrgbClr r="0" g="0" b="0"/>
+      </a:effectRef>
+      <a:fontRef idx="minor">
+        <a:schemeClr val="lt1"/>
+      </a:fontRef>
+    </dgm:style>
+  </dgm:styleLbl>
+  <dgm:styleLbl name="fgSibTrans2D1">
+    <dgm:scene3d>
+      <a:camera prst="orthographicFront"/>
+      <a:lightRig rig="threePt" dir="t"/>
+    </dgm:scene3d>
+    <dgm:sp3d/>
+    <dgm:txPr/>
+    <dgm:style>
+      <a:lnRef idx="0">
+        <a:scrgbClr r="0" g="0" b="0"/>
+      </a:lnRef>
+      <a:fillRef idx="1">
+        <a:scrgbClr r="0" g="0" b="0"/>
+      </a:fillRef>
+      <a:effectRef idx="0">
+        <a:scrgbClr r="0" g="0" b="0"/>
+      </a:effectRef>
+      <a:fontRef idx="minor">
+        <a:schemeClr val="lt1"/>
+      </a:fontRef>
+    </dgm:style>
+  </dgm:styleLbl>
+  <dgm:styleLbl name="bgSibTrans2D1">
+    <dgm:scene3d>
+      <a:camera prst="orthographicFront"/>
+      <a:lightRig rig="threePt" dir="t"/>
+    </dgm:scene3d>
+    <dgm:sp3d/>
+    <dgm:txPr/>
+    <dgm:style>
+      <a:lnRef idx="0">
+        <a:scrgbClr r="0" g="0" b="0"/>
+      </a:lnRef>
+      <a:fillRef idx="1">
+        <a:scrgbClr r="0" g="0" b="0"/>
+      </a:fillRef>
+      <a:effectRef idx="0">
+        <a:scrgbClr r="0" g="0" b="0"/>
+      </a:effectRef>
+      <a:fontRef idx="minor">
+        <a:schemeClr val="lt1"/>
+      </a:fontRef>
+    </dgm:style>
+  </dgm:styleLbl>
+  <dgm:styleLbl name="sibTrans1D1">
+    <dgm:scene3d>
+      <a:camera prst="orthographicFront"/>
+      <a:lightRig rig="threePt" dir="t"/>
+    </dgm:scene3d>
+    <dgm:sp3d/>
+    <dgm:txPr/>
+    <dgm:style>
+      <a:lnRef idx="1">
+        <a:scrgbClr r="0" g="0" b="0"/>
+      </a:lnRef>
+      <a:fillRef idx="0">
+        <a:scrgbClr r="0" g="0" b="0"/>
+      </a:fillRef>
+      <a:effectRef idx="0">
+        <a:scrgbClr r="0" g="0" b="0"/>
+      </a:effectRef>
+      <a:fontRef idx="minor"/>
+    </dgm:style>
+  </dgm:styleLbl>
+  <dgm:styleLbl name="callout">
+    <dgm:scene3d>
+      <a:camera prst="orthographicFront"/>
+      <a:lightRig rig="threePt" dir="t"/>
+    </dgm:scene3d>
+    <dgm:sp3d/>
+    <dgm:txPr/>
+    <dgm:style>
+      <a:lnRef idx="2">
+        <a:scrgbClr r="0" g="0" b="0"/>
+      </a:lnRef>
+      <a:fillRef idx="1">
+        <a:scrgbClr r="0" g="0" b="0"/>
+      </a:fillRef>
+      <a:effectRef idx="0">
+        <a:scrgbClr r="0" g="0" b="0"/>
+      </a:effectRef>
+      <a:fontRef idx="minor"/>
+    </dgm:style>
+  </dgm:styleLbl>
+  <dgm:styleLbl name="asst0">
+    <dgm:scene3d>
+      <a:camera prst="orthographicFront"/>
+      <a:lightRig rig="threePt" dir="t"/>
+    </dgm:scene3d>
+    <dgm:sp3d/>
+    <dgm:txPr/>
+    <dgm:style>
+      <a:lnRef idx="2">
+        <a:scrgbClr r="0" g="0" b="0"/>
+      </a:lnRef>
+      <a:fillRef idx="1">
+        <a:scrgbClr r="0" g="0" b="0"/>
+      </a:fillRef>
+      <a:effectRef idx="0">
+        <a:scrgbClr r="0" g="0" b="0"/>
+      </a:effectRef>
+      <a:fontRef idx="minor">
+        <a:schemeClr val="lt1"/>
+      </a:fontRef>
+    </dgm:style>
+  </dgm:styleLbl>
+  <dgm:styleLbl name="asst1">
+    <dgm:scene3d>
+      <a:camera prst="orthographicFront"/>
+      <a:lightRig rig="threePt" dir="t"/>
+    </dgm:scene3d>
+    <dgm:sp3d/>
+    <dgm:txPr/>
+    <dgm:style>
+      <a:lnRef idx="2">
+        <a:scrgbClr r="0" g="0" b="0"/>
+      </a:lnRef>
+      <a:fillRef idx="1">
+        <a:scrgbClr r="0" g="0" b="0"/>
+      </a:fillRef>
+      <a:effectRef idx="0">
+        <a:scrgbClr r="0" g="0" b="0"/>
+      </a:effectRef>
+      <a:fontRef idx="minor">
+        <a:schemeClr val="lt1"/>
+      </a:fontRef>
+    </dgm:style>
+  </dgm:styleLbl>
+  <dgm:styleLbl name="asst2">
+    <dgm:scene3d>
+      <a:camera prst="orthographicFront"/>
+      <a:lightRig rig="threePt" dir="t"/>
+    </dgm:scene3d>
+    <dgm:sp3d/>
+    <dgm:txPr/>
+    <dgm:style>
+      <a:lnRef idx="2">
+        <a:scrgbClr r="0" g="0" b="0"/>
+      </a:lnRef>
+      <a:fillRef idx="1">
+        <a:scrgbClr r="0" g="0" b="0"/>
+      </a:fillRef>
+      <a:effectRef idx="0">
+        <a:scrgbClr r="0" g="0" b="0"/>
+      </a:effectRef>
+      <a:fontRef idx="minor">
+        <a:schemeClr val="lt1"/>
+      </a:fontRef>
+    </dgm:style>
+  </dgm:styleLbl>
+  <dgm:styleLbl name="asst3">
+    <dgm:scene3d>
+      <a:camera prst="orthographicFront"/>
+      <a:lightRig rig="threePt" dir="t"/>
+    </dgm:scene3d>
+    <dgm:sp3d/>
+    <dgm:txPr/>
+    <dgm:style>
+      <a:lnRef idx="2">
+        <a:scrgbClr r="0" g="0" b="0"/>
+      </a:lnRef>
+      <a:fillRef idx="1">
+        <a:scrgbClr r="0" g="0" b="0"/>
+      </a:fillRef>
+      <a:effectRef idx="0">
+        <a:scrgbClr r="0" g="0" b="0"/>
+      </a:effectRef>
+      <a:fontRef idx="minor">
+        <a:schemeClr val="lt1"/>
+      </a:fontRef>
+    </dgm:style>
+  </dgm:styleLbl>
+  <dgm:styleLbl name="asst4">
+    <dgm:scene3d>
+      <a:camera prst="orthographicFront"/>
+      <a:lightRig rig="threePt" dir="t"/>
+    </dgm:scene3d>
+    <dgm:sp3d/>
+    <dgm:txPr/>
+    <dgm:style>
+      <a:lnRef idx="2">
+        <a:scrgbClr r="0" g="0" b="0"/>
+      </a:lnRef>
+      <a:fillRef idx="1">
+        <a:scrgbClr r="0" g="0" b="0"/>
+      </a:fillRef>
+      <a:effectRef idx="0">
+        <a:scrgbClr r="0" g="0" b="0"/>
+      </a:effectRef>
+      <a:fontRef idx="minor">
+        <a:schemeClr val="lt1"/>
+      </a:fontRef>
+    </dgm:style>
+  </dgm:styleLbl>
+  <dgm:styleLbl name="parChTrans2D1">
+    <dgm:scene3d>
+      <a:camera prst="orthographicFront"/>
+      <a:lightRig rig="threePt" dir="t"/>
+    </dgm:scene3d>
+    <dgm:sp3d/>
+    <dgm:txPr/>
+    <dgm:style>
+      <a:lnRef idx="2">
+        <a:scrgbClr r="0" g="0" b="0"/>
+      </a:lnRef>
+      <a:fillRef idx="1">
+        <a:scrgbClr r="0" g="0" b="0"/>
+      </a:fillRef>
+      <a:effectRef idx="0">
+        <a:scrgbClr r="0" g="0" b="0"/>
+      </a:effectRef>
+      <a:fontRef idx="minor">
+        <a:schemeClr val="lt1"/>
+      </a:fontRef>
+    </dgm:style>
+  </dgm:styleLbl>
+  <dgm:styleLbl name="parChTrans2D2">
+    <dgm:scene3d>
+      <a:camera prst="orthographicFront"/>
+      <a:lightRig rig="threePt" dir="t"/>
+    </dgm:scene3d>
+    <dgm:sp3d/>
+    <dgm:txPr/>
+    <dgm:style>
+      <a:lnRef idx="2">
+        <a:scrgbClr r="0" g="0" b="0"/>
+      </a:lnRef>
+      <a:fillRef idx="1">
+        <a:scrgbClr r="0" g="0" b="0"/>
+      </a:fillRef>
+      <a:effectRef idx="0">
+        <a:scrgbClr r="0" g="0" b="0"/>
+      </a:effectRef>
+      <a:fontRef idx="minor">
+        <a:schemeClr val="lt1"/>
+      </a:fontRef>
+    </dgm:style>
+  </dgm:styleLbl>
+  <dgm:styleLbl name="parChTrans2D3">
+    <dgm:scene3d>
+      <a:camera prst="orthographicFront"/>
+      <a:lightRig rig="threePt" dir="t"/>
+    </dgm:scene3d>
+    <dgm:sp3d/>
+    <dgm:txPr/>
+    <dgm:style>
+      <a:lnRef idx="2">
+        <a:scrgbClr r="0" g="0" b="0"/>
+      </a:lnRef>
+      <a:fillRef idx="1">
+        <a:scrgbClr r="0" g="0" b="0"/>
+      </a:fillRef>
+      <a:effectRef idx="0">
+        <a:scrgbClr r="0" g="0" b="0"/>
+      </a:effectRef>
+      <a:fontRef idx="minor">
+        <a:schemeClr val="lt1"/>
+      </a:fontRef>
+    </dgm:style>
+  </dgm:styleLbl>
+  <dgm:styleLbl name="parChTrans2D4">
+    <dgm:scene3d>
+      <a:camera prst="orthographicFront"/>
+      <a:lightRig rig="threePt" dir="t"/>
+    </dgm:scene3d>
+    <dgm:sp3d/>
+    <dgm:txPr/>
+    <dgm:style>
+      <a:lnRef idx="2">
+        <a:scrgbClr r="0" g="0" b="0"/>
+      </a:lnRef>
+      <a:fillRef idx="1">
+        <a:scrgbClr r="0" g="0" b="0"/>
+      </a:fillRef>
+      <a:effectRef idx="0">
+        <a:scrgbClr r="0" g="0" b="0"/>
+      </a:effectRef>
+      <a:fontRef idx="minor">
+        <a:schemeClr val="lt1"/>
+      </a:fontRef>
+    </dgm:style>
+  </dgm:styleLbl>
+  <dgm:styleLbl name="parChTrans1D1">
+    <dgm:scene3d>
+      <a:camera prst="orthographicFront"/>
+      <a:lightRig rig="threePt" dir="t"/>
+    </dgm:scene3d>
+    <dgm:sp3d/>
+    <dgm:txPr/>
+    <dgm:style>
+      <a:lnRef idx="2">
+        <a:scrgbClr r="0" g="0" b="0"/>
+      </a:lnRef>
+      <a:fillRef idx="0">
+        <a:scrgbClr r="0" g="0" b="0"/>
+      </a:fillRef>
+      <a:effectRef idx="0">
+        <a:scrgbClr r="0" g="0" b="0"/>
+      </a:effectRef>
+      <a:fontRef idx="minor"/>
+    </dgm:style>
+  </dgm:styleLbl>
+  <dgm:styleLbl name="parChTrans1D2">
+    <dgm:scene3d>
+      <a:camera prst="orthographicFront"/>
+      <a:lightRig rig="threePt" dir="t"/>
+    </dgm:scene3d>
+    <dgm:sp3d/>
+    <dgm:txPr/>
+    <dgm:style>
+      <a:lnRef idx="2">
+        <a:scrgbClr r="0" g="0" b="0"/>
+      </a:lnRef>
+      <a:fillRef idx="0">
+        <a:scrgbClr r="0" g="0" b="0"/>
+      </a:fillRef>
+      <a:effectRef idx="0">
+        <a:scrgbClr r="0" g="0" b="0"/>
+      </a:effectRef>
+      <a:fontRef idx="minor"/>
+    </dgm:style>
+  </dgm:styleLbl>
+  <dgm:styleLbl name="parChTrans1D3">
+    <dgm:scene3d>
+      <a:camera prst="orthographicFront"/>
+      <a:lightRig rig="threePt" dir="t"/>
+    </dgm:scene3d>
+    <dgm:sp3d/>
+    <dgm:txPr/>
+    <dgm:style>
+      <a:lnRef idx="2">
+        <a:scrgbClr r="0" g="0" b="0"/>
+      </a:lnRef>
+      <a:fillRef idx="0">
+        <a:scrgbClr r="0" g="0" b="0"/>
+      </a:fillRef>
+      <a:effectRef idx="0">
+        <a:scrgbClr r="0" g="0" b="0"/>
+      </a:effectRef>
+      <a:fontRef idx="minor"/>
+    </dgm:style>
+  </dgm:styleLbl>
+  <dgm:styleLbl name="parChTrans1D4">
+    <dgm:scene3d>
+      <a:camera prst="orthographicFront"/>
+      <a:lightRig rig="threePt" dir="t"/>
+    </dgm:scene3d>
+    <dgm:sp3d/>
+    <dgm:txPr/>
+    <dgm:style>
+      <a:lnRef idx="2">
+        <a:scrgbClr r="0" g="0" b="0"/>
+      </a:lnRef>
+      <a:fillRef idx="0">
+        <a:scrgbClr r="0" g="0" b="0"/>
+      </a:fillRef>
+      <a:effectRef idx="0">
+        <a:scrgbClr r="0" g="0" b="0"/>
+      </a:effectRef>
+      <a:fontRef idx="minor"/>
+    </dgm:style>
+  </dgm:styleLbl>
+  <dgm:styleLbl name="fgAcc1">
+    <dgm:scene3d>
+      <a:camera prst="orthographicFront"/>
+      <a:lightRig rig="threePt" dir="t"/>
+    </dgm:scene3d>
+    <dgm:sp3d/>
+    <dgm:txPr/>
+    <dgm:style>
+      <a:lnRef idx="2">
+        <a:scrgbClr r="0" g="0" b="0"/>
+      </a:lnRef>
+      <a:fillRef idx="1">
+        <a:scrgbClr r="0" g="0" b="0"/>
+      </a:fillRef>
+      <a:effectRef idx="0">
+        <a:scrgbClr r="0" g="0" b="0"/>
+      </a:effectRef>
+      <a:fontRef idx="minor"/>
+    </dgm:style>
+  </dgm:styleLbl>
+  <dgm:styleLbl name="conFgAcc1">
+    <dgm:scene3d>
+      <a:camera prst="orthographicFront"/>
+      <a:lightRig rig="threePt" dir="t"/>
+    </dgm:scene3d>
+    <dgm:sp3d/>
+    <dgm:txPr/>
+    <dgm:style>
+      <a:lnRef idx="2">
+        <a:scrgbClr r="0" g="0" b="0"/>
+      </a:lnRef>
+      <a:fillRef idx="1">
+        <a:scrgbClr r="0" g="0" b="0"/>
+      </a:fillRef>
+      <a:effectRef idx="0">
+        <a:scrgbClr r="0" g="0" b="0"/>
+      </a:effectRef>
+      <a:fontRef idx="minor"/>
+    </dgm:style>
+  </dgm:styleLbl>
+  <dgm:styleLbl name="alignAcc1">
+    <dgm:scene3d>
+      <a:camera prst="orthographicFront"/>
+      <a:lightRig rig="threePt" dir="t"/>
+    </dgm:scene3d>
+    <dgm:sp3d/>
+    <dgm:txPr/>
+    <dgm:style>
+      <a:lnRef idx="2">
+        <a:scrgbClr r="0" g="0" b="0"/>
+      </a:lnRef>
+      <a:fillRef idx="1">
+        <a:scrgbClr r="0" g="0" b="0"/>
+      </a:fillRef>
+      <a:effectRef idx="0">
+        <a:scrgbClr r="0" g="0" b="0"/>
+      </a:effectRef>
+      <a:fontRef idx="minor"/>
+    </dgm:style>
+  </dgm:styleLbl>
+  <dgm:styleLbl name="trAlignAcc1">
+    <dgm:scene3d>
+      <a:camera prst="orthographicFront"/>
+      <a:lightRig rig="threePt" dir="t"/>
+    </dgm:scene3d>
+    <dgm:sp3d/>
+    <dgm:txPr/>
+    <dgm:style>
+      <a:lnRef idx="1">
+        <a:scrgbClr r="0" g="0" b="0"/>
+      </a:lnRef>
+      <a:fillRef idx="1">
+        <a:scrgbClr r="0" g="0" b="0"/>
+      </a:fillRef>
+      <a:effectRef idx="0">
+        <a:scrgbClr r="0" g="0" b="0"/>
+      </a:effectRef>
+      <a:fontRef idx="minor"/>
+    </dgm:style>
+  </dgm:styleLbl>
+  <dgm:styleLbl name="bgAcc1">
+    <dgm:scene3d>
+      <a:camera prst="orthographicFront"/>
+      <a:lightRig rig="threePt" dir="t"/>
+    </dgm:scene3d>
+    <dgm:sp3d/>
+    <dgm:txPr/>
+    <dgm:style>
+      <a:lnRef idx="2">
+        <a:scrgbClr r="0" g="0" b="0"/>
+      </a:lnRef>
+      <a:fillRef idx="1">
+        <a:scrgbClr r="0" g="0" b="0"/>
+      </a:fillRef>
+      <a:effectRef idx="0">
+        <a:scrgbClr r="0" g="0" b="0"/>
+      </a:effectRef>
+      <a:fontRef idx="minor"/>
+    </dgm:style>
+  </dgm:styleLbl>
+  <dgm:styleLbl name="solidFgAcc1">
+    <dgm:scene3d>
+      <a:camera prst="orthographicFront"/>
+      <a:lightRig rig="threePt" dir="t"/>
+    </dgm:scene3d>
+    <dgm:sp3d/>
+    <dgm:txPr/>
+    <dgm:style>
+      <a:lnRef idx="2">
+        <a:scrgbClr r="0" g="0" b="0"/>
+      </a:lnRef>
+      <a:fillRef idx="1">
+        <a:scrgbClr r="0" g="0" b="0"/>
+      </a:fillRef>
+      <a:effectRef idx="0">
+        <a:scrgbClr r="0" g="0" b="0"/>
+      </a:effectRef>
+      <a:fontRef idx="minor"/>
+    </dgm:style>
+  </dgm:styleLbl>
+  <dgm:styleLbl name="solidAlignAcc1">
+    <dgm:scene3d>
+      <a:camera prst="orthographicFront"/>
+      <a:lightRig rig="threePt" dir="t"/>
+    </dgm:scene3d>
+    <dgm:sp3d/>
+    <dgm:txPr/>
+    <dgm:style>
+      <a:lnRef idx="2">
+        <a:scrgbClr r="0" g="0" b="0"/>
+      </a:lnRef>
+      <a:fillRef idx="1">
+        <a:scrgbClr r="0" g="0" b="0"/>
+      </a:fillRef>
+      <a:effectRef idx="0">
+        <a:scrgbClr r="0" g="0" b="0"/>
+      </a:effectRef>
+      <a:fontRef idx="minor"/>
+    </dgm:style>
+  </dgm:styleLbl>
+  <dgm:styleLbl name="solidBgAcc1">
+    <dgm:scene3d>
+      <a:camera prst="orthographicFront"/>
+      <a:lightRig rig="threePt" dir="t"/>
+    </dgm:scene3d>
+    <dgm:sp3d/>
+    <dgm:txPr/>
+    <dgm:style>
+      <a:lnRef idx="2">
+        <a:scrgbClr r="0" g="0" b="0"/>
+      </a:lnRef>
+      <a:fillRef idx="1">
+        <a:scrgbClr r="0" g="0" b="0"/>
+      </a:fillRef>
+      <a:effectRef idx="0">
+        <a:scrgbClr r="0" g="0" b="0"/>
+      </a:effectRef>
+      <a:fontRef idx="minor"/>
+    </dgm:style>
+  </dgm:styleLbl>
+  <dgm:styleLbl name="fgAccFollowNode1">
+    <dgm:scene3d>
+      <a:camera prst="orthographicFront"/>
+      <a:lightRig rig="threePt" dir="t"/>
+    </dgm:scene3d>
+    <dgm:sp3d/>
+    <dgm:txPr/>
+    <dgm:style>
+      <a:lnRef idx="2">
+        <a:scrgbClr r="0" g="0" b="0"/>
+      </a:lnRef>
+      <a:fillRef idx="1">
+        <a:scrgbClr r="0" g="0" b="0"/>
+      </a:fillRef>
+      <a:effectRef idx="0">
+        <a:scrgbClr r="0" g="0" b="0"/>
+      </a:effectRef>
+      <a:fontRef idx="minor"/>
+    </dgm:style>
+  </dgm:styleLbl>
+  <dgm:styleLbl name="alignAccFollowNode1">
+    <dgm:scene3d>
+      <a:camera prst="orthographicFront"/>
+      <a:lightRig rig="threePt" dir="t"/>
+    </dgm:scene3d>
+    <dgm:sp3d/>
+    <dgm:txPr/>
+    <dgm:style>
+      <a:lnRef idx="2">
+        <a:scrgbClr r="0" g="0" b="0"/>
+      </a:lnRef>
+      <a:fillRef idx="1">
+        <a:scrgbClr r="0" g="0" b="0"/>
+      </a:fillRef>
+      <a:effectRef idx="0">
+        <a:scrgbClr r="0" g="0" b="0"/>
+      </a:effectRef>
+      <a:fontRef idx="minor"/>
+    </dgm:style>
+  </dgm:styleLbl>
+  <dgm:styleLbl name="bgAccFollowNode1">
+    <dgm:scene3d>
+      <a:camera prst="orthographicFront"/>
+      <a:lightRig rig="threePt" dir="t"/>
+    </dgm:scene3d>
+    <dgm:sp3d/>
+    <dgm:txPr/>
+    <dgm:style>
+      <a:lnRef idx="2">
+        <a:scrgbClr r="0" g="0" b="0"/>
+      </a:lnRef>
+      <a:fillRef idx="1">
+        <a:scrgbClr r="0" g="0" b="0"/>
+      </a:fillRef>
+      <a:effectRef idx="0">
+        <a:scrgbClr r="0" g="0" b="0"/>
+      </a:effectRef>
+      <a:fontRef idx="minor"/>
+    </dgm:style>
+  </dgm:styleLbl>
+  <dgm:styleLbl name="fgAcc0">
+    <dgm:scene3d>
+      <a:camera prst="orthographicFront"/>
+      <a:lightRig rig="threePt" dir="t"/>
+    </dgm:scene3d>
+    <dgm:sp3d/>
+    <dgm:txPr/>
+    <dgm:style>
+      <a:lnRef idx="2">
+        <a:scrgbClr r="0" g="0" b="0"/>
+      </a:lnRef>
+      <a:fillRef idx="1">
+        <a:scrgbClr r="0" g="0" b="0"/>
+      </a:fillRef>
+      <a:effectRef idx="0">
+        <a:scrgbClr r="0" g="0" b="0"/>
+      </a:effectRef>
+      <a:fontRef idx="minor"/>
+    </dgm:style>
+  </dgm:styleLbl>
+  <dgm:styleLbl name="fgAcc2">
+    <dgm:scene3d>
+      <a:camera prst="orthographicFront"/>
+      <a:lightRig rig="threePt" dir="t"/>
+    </dgm:scene3d>
+    <dgm:sp3d/>
+    <dgm:txPr/>
+    <dgm:style>
+      <a:lnRef idx="2">
+        <a:scrgbClr r="0" g="0" b="0"/>
+      </a:lnRef>
+      <a:fillRef idx="1">
+        <a:scrgbClr r="0" g="0" b="0"/>
+      </a:fillRef>
+      <a:effectRef idx="0">
+        <a:scrgbClr r="0" g="0" b="0"/>
+      </a:effectRef>
+      <a:fontRef idx="minor"/>
+    </dgm:style>
+  </dgm:styleLbl>
+  <dgm:styleLbl name="fgAcc3">
+    <dgm:scene3d>
+      <a:camera prst="orthographicFront"/>
+      <a:lightRig rig="threePt" dir="t"/>
+    </dgm:scene3d>
+    <dgm:sp3d/>
+    <dgm:txPr/>
+    <dgm:style>
+      <a:lnRef idx="2">
+        <a:scrgbClr r="0" g="0" b="0"/>
+      </a:lnRef>
+      <a:fillRef idx="1">
+        <a:scrgbClr r="0" g="0" b="0"/>
+      </a:fillRef>
+      <a:effectRef idx="0">
+        <a:scrgbClr r="0" g="0" b="0"/>
+      </a:effectRef>
+      <a:fontRef idx="minor"/>
+    </dgm:style>
+  </dgm:styleLbl>
+  <dgm:styleLbl name="fgAcc4">
+    <dgm:scene3d>
+      <a:camera prst="orthographicFront"/>
+      <a:lightRig rig="threePt" dir="t"/>
+    </dgm:scene3d>
+    <dgm:sp3d/>
+    <dgm:txPr/>
+    <dgm:style>
+      <a:lnRef idx="2">
+        <a:scrgbClr r="0" g="0" b="0"/>
+      </a:lnRef>
+      <a:fillRef idx="1">
+        <a:scrgbClr r="0" g="0" b="0"/>
+      </a:fillRef>
+      <a:effectRef idx="0">
+        <a:scrgbClr r="0" g="0" b="0"/>
+      </a:effectRef>
+      <a:fontRef idx="minor"/>
+    </dgm:style>
+  </dgm:styleLbl>
+  <dgm:styleLbl name="bgShp">
+    <dgm:scene3d>
+      <a:camera prst="orthographicFront"/>
+      <a:lightRig rig="threePt" dir="t"/>
+    </dgm:scene3d>
+    <dgm:sp3d/>
+    <dgm:txPr/>
+    <dgm:style>
+      <a:lnRef idx="0">
+        <a:scrgbClr r="0" g="0" b="0"/>
+      </a:lnRef>
+      <a:fillRef idx="1">
+        <a:scrgbClr r="0" g="0" b="0"/>
+      </a:fillRef>
+      <a:effectRef idx="0">
+        <a:scrgbClr r="0" g="0" b="0"/>
+      </a:effectRef>
+      <a:fontRef idx="minor"/>
+    </dgm:style>
+  </dgm:styleLbl>
+  <dgm:styleLbl name="dkBgShp">
+    <dgm:scene3d>
+      <a:camera prst="orthographicFront"/>
+      <a:lightRig rig="threePt" dir="t"/>
+    </dgm:scene3d>
+    <dgm:sp3d/>
+    <dgm:txPr/>
+    <dgm:style>
+      <a:lnRef idx="0">
+        <a:scrgbClr r="0" g="0" b="0"/>
+      </a:lnRef>
+      <a:fillRef idx="1">
+        <a:scrgbClr r="0" g="0" b="0"/>
+      </a:fillRef>
+      <a:effectRef idx="0">
+        <a:scrgbClr r="0" g="0" b="0"/>
+      </a:effectRef>
+      <a:fontRef idx="minor"/>
+    </dgm:style>
+  </dgm:styleLbl>
+  <dgm:styleLbl name="trBgShp">
+    <dgm:scene3d>
+      <a:camera prst="orthographicFront"/>
+      <a:lightRig rig="threePt" dir="t"/>
+    </dgm:scene3d>
+    <dgm:sp3d/>
+    <dgm:txPr/>
+    <dgm:style>
+      <a:lnRef idx="0">
+        <a:scrgbClr r="0" g="0" b="0"/>
+      </a:lnRef>
+      <a:fillRef idx="1">
+        <a:scrgbClr r="0" g="0" b="0"/>
+      </a:fillRef>
+      <a:effectRef idx="0">
+        <a:scrgbClr r="0" g="0" b="0"/>
+      </a:effectRef>
+      <a:fontRef idx="minor"/>
+    </dgm:style>
+  </dgm:styleLbl>
+  <dgm:styleLbl name="fgShp">
+    <dgm:scene3d>
+      <a:camera prst="orthographicFront"/>
+      <a:lightRig rig="threePt" dir="t"/>
+    </dgm:scene3d>
+    <dgm:sp3d/>
+    <dgm:txPr/>
+    <dgm:style>
+      <a:lnRef idx="2">
+        <a:scrgbClr r="0" g="0" b="0"/>
+      </a:lnRef>
+      <a:fillRef idx="1">
+        <a:scrgbClr r="0" g="0" b="0"/>
+      </a:fillRef>
+      <a:effectRef idx="0">
+        <a:scrgbClr r="0" g="0" b="0"/>
+      </a:effectRef>
+      <a:fontRef idx="minor"/>
+    </dgm:style>
+  </dgm:styleLbl>
+  <dgm:styleLbl name="revTx">
+    <dgm:scene3d>
+      <a:camera prst="orthographicFront"/>
+      <a:lightRig rig="threePt" dir="t"/>
+    </dgm:scene3d>
+    <dgm:sp3d/>
+    <dgm:txPr/>
+    <dgm:style>
+      <a:lnRef idx="0">
+        <a:scrgbClr r="0" g="0" b="0"/>
+      </a:lnRef>
+      <a:fillRef idx="0">
+        <a:scrgbClr r="0" g="0" b="0"/>
+      </a:fillRef>
+      <a:effectRef idx="0">
+        <a:scrgbClr r="0" g="0" b="0"/>
+      </a:effectRef>
+      <a:fontRef idx="minor"/>
+    </dgm:style>
+  </dgm:styleLbl>
+</dgm:styleDef>
 </file>
 
 <file path=ppt/handoutMasters/handoutMaster1.xml><?xml version="1.0" encoding="utf-8"?>
@@ -180,6 +3032,11 @@
         </a:xfrm>
       </p:grpSpPr>
     </p:spTree>
+    <p:extLst>
+      <p:ext uri="{BB962C8B-B14F-4D97-AF65-F5344CB8AC3E}">
+        <p14:creationId xmlns:p14="http://schemas.microsoft.com/office/powerpoint/2010/main" val="1"/>
+      </p:ext>
+    </p:extLst>
   </p:cSld>
   <p:clrMap bg1="lt1" tx1="dk1" bg2="lt2" tx2="dk2" accent1="accent1" accent2="accent2" accent3="accent3" accent4="accent4" accent5="accent5" accent6="accent6" hlink="hlink" folHlink="folHlink"/>
 </p:handoutMaster>
@@ -1102,7 +3959,7 @@
             </a:pPr>
             <a:fld id="{AA2729F6-BE62-4B64-80D4-C40ABB8438D2}" type="datetime1">
               <a:rPr lang="en-US" altLang="ru-RU" smtClean="0"/>
-              <a:t>4/22/2023</a:t>
+              <a:t>4/24/2023</a:t>
             </a:fld>
             <a:endParaRPr lang="en-GB" altLang="ru-RU"/>
           </a:p>
@@ -1328,7 +4185,7 @@
             </a:pPr>
             <a:fld id="{A971AEBD-59E9-4BE0-9330-A7885D4488E6}" type="datetime1">
               <a:rPr lang="en-US" altLang="ru-RU" smtClean="0"/>
-              <a:t>4/22/2023</a:t>
+              <a:t>4/24/2023</a:t>
             </a:fld>
             <a:endParaRPr lang="en-GB" altLang="ru-RU"/>
           </a:p>
@@ -1562,7 +4419,7 @@
             </a:pPr>
             <a:fld id="{BE30B078-2443-4756-ADA2-4D3BF0528076}" type="datetime1">
               <a:rPr lang="en-US" altLang="ru-RU" smtClean="0"/>
-              <a:t>4/22/2023</a:t>
+              <a:t>4/24/2023</a:t>
             </a:fld>
             <a:endParaRPr lang="ru-RU" altLang="ru-RU"/>
           </a:p>
@@ -1787,7 +4644,7 @@
             </a:pPr>
             <a:fld id="{D3C140D1-742F-41A7-A0E5-0C9D142DE91F}" type="datetime1">
               <a:rPr lang="en-US" altLang="ru-RU" smtClean="0"/>
-              <a:t>4/22/2023</a:t>
+              <a:t>4/24/2023</a:t>
             </a:fld>
             <a:endParaRPr lang="ru-RU" altLang="ru-RU"/>
           </a:p>
@@ -2026,7 +4883,7 @@
             </a:pPr>
             <a:fld id="{ACCBEB3C-93C7-459F-BF55-9702FE534DEC}" type="datetime1">
               <a:rPr lang="en-US" altLang="ru-RU" smtClean="0"/>
-              <a:t>4/22/2023</a:t>
+              <a:t>4/24/2023</a:t>
             </a:fld>
             <a:endParaRPr lang="ru-RU" altLang="ru-RU"/>
           </a:p>
@@ -2361,7 +5218,7 @@
             </a:pPr>
             <a:fld id="{E8337E0D-7F1E-4476-9A09-25F7F4615BB9}" type="datetime1">
               <a:rPr lang="en-US" altLang="ru-RU" smtClean="0"/>
-              <a:t>4/22/2023</a:t>
+              <a:t>4/24/2023</a:t>
             </a:fld>
             <a:endParaRPr lang="ru-RU" altLang="ru-RU"/>
           </a:p>
@@ -2835,7 +5692,7 @@
             </a:pPr>
             <a:fld id="{2A7B93FD-4F38-4849-834E-BEE268DD9C70}" type="datetime1">
               <a:rPr lang="en-US" altLang="ru-RU" smtClean="0"/>
-              <a:t>4/22/2023</a:t>
+              <a:t>4/24/2023</a:t>
             </a:fld>
             <a:endParaRPr lang="ru-RU" altLang="ru-RU"/>
           </a:p>
@@ -3000,7 +5857,7 @@
             </a:pPr>
             <a:fld id="{1CF1C277-2618-47FF-A0BA-4178A16A4478}" type="datetime1">
               <a:rPr lang="en-US" altLang="ru-RU" smtClean="0"/>
-              <a:t>4/22/2023</a:t>
+              <a:t>4/24/2023</a:t>
             </a:fld>
             <a:endParaRPr lang="ru-RU" altLang="ru-RU"/>
           </a:p>
@@ -3142,7 +5999,7 @@
             </a:pPr>
             <a:fld id="{0F267C6A-67BB-4711-A73C-45D933EE4B3A}" type="datetime1">
               <a:rPr lang="en-US" altLang="ru-RU" smtClean="0"/>
-              <a:t>4/22/2023</a:t>
+              <a:t>4/24/2023</a:t>
             </a:fld>
             <a:endParaRPr lang="ru-RU" altLang="ru-RU"/>
           </a:p>
@@ -3466,7 +6323,7 @@
             </a:pPr>
             <a:fld id="{E37923C0-30FF-4CB6-A722-BAD7A0018545}" type="datetime1">
               <a:rPr lang="en-US" altLang="ru-RU" smtClean="0"/>
-              <a:t>4/22/2023</a:t>
+              <a:t>4/24/2023</a:t>
             </a:fld>
             <a:endParaRPr lang="ru-RU" altLang="ru-RU"/>
           </a:p>
@@ -3683,7 +6540,7 @@
             </a:pPr>
             <a:fld id="{034838F0-215A-4DA9-8E28-73DF1EC06E29}" type="datetime1">
               <a:rPr lang="en-US" altLang="ru-RU" smtClean="0"/>
-              <a:t>4/22/2023</a:t>
+              <a:t>4/24/2023</a:t>
             </a:fld>
             <a:endParaRPr lang="en-GB" altLang="ru-RU"/>
           </a:p>
@@ -3983,7 +6840,7 @@
             </a:pPr>
             <a:fld id="{D6C30FB6-AF93-4E21-A03B-23D53FD74BEB}" type="datetime1">
               <a:rPr lang="en-US" altLang="ru-RU" smtClean="0"/>
-              <a:t>4/22/2023</a:t>
+              <a:t>4/24/2023</a:t>
             </a:fld>
             <a:endParaRPr lang="ru-RU" altLang="ru-RU"/>
           </a:p>
@@ -4200,7 +7057,7 @@
             </a:pPr>
             <a:fld id="{A41AA25A-3DD9-4EA4-8D51-9E9C9B60FEB9}" type="datetime1">
               <a:rPr lang="en-US" altLang="ru-RU" smtClean="0"/>
-              <a:t>4/22/2023</a:t>
+              <a:t>4/24/2023</a:t>
             </a:fld>
             <a:endParaRPr lang="ru-RU" altLang="ru-RU"/>
           </a:p>
@@ -4427,7 +7284,7 @@
             </a:pPr>
             <a:fld id="{1088C13B-FBEE-46F1-BBA4-28F791036F5E}" type="datetime1">
               <a:rPr lang="en-US" altLang="ru-RU" smtClean="0"/>
-              <a:t>4/22/2023</a:t>
+              <a:t>4/24/2023</a:t>
             </a:fld>
             <a:endParaRPr lang="ru-RU" altLang="ru-RU"/>
           </a:p>
@@ -4666,7 +7523,7 @@
             </a:pPr>
             <a:fld id="{920785E7-F2C6-410F-8B32-72B7420158C4}" type="datetime1">
               <a:rPr lang="en-US" altLang="ru-RU" smtClean="0"/>
-              <a:t>4/22/2023</a:t>
+              <a:t>4/24/2023</a:t>
             </a:fld>
             <a:endParaRPr lang="en-GB" altLang="ru-RU"/>
           </a:p>
@@ -5000,7 +7857,7 @@
             </a:pPr>
             <a:fld id="{5D8D523E-9E65-4CF2-8F47-1B769A2636B8}" type="datetime1">
               <a:rPr lang="en-US" altLang="ru-RU" smtClean="0"/>
-              <a:t>4/22/2023</a:t>
+              <a:t>4/24/2023</a:t>
             </a:fld>
             <a:endParaRPr lang="en-GB" altLang="ru-RU"/>
           </a:p>
@@ -5473,7 +8330,7 @@
             </a:pPr>
             <a:fld id="{49D32DC6-1689-48FD-984D-0F000C1AFE8B}" type="datetime1">
               <a:rPr lang="en-US" altLang="ru-RU" smtClean="0"/>
-              <a:t>4/22/2023</a:t>
+              <a:t>4/24/2023</a:t>
             </a:fld>
             <a:endParaRPr lang="en-GB" altLang="ru-RU"/>
           </a:p>
@@ -5637,7 +8494,7 @@
             </a:pPr>
             <a:fld id="{95E6E65F-B7FA-470F-B337-BA937C25378A}" type="datetime1">
               <a:rPr lang="en-US" altLang="ru-RU" smtClean="0"/>
-              <a:t>4/22/2023</a:t>
+              <a:t>4/24/2023</a:t>
             </a:fld>
             <a:endParaRPr lang="en-GB" altLang="ru-RU"/>
           </a:p>
@@ -5778,7 +8635,7 @@
             </a:pPr>
             <a:fld id="{661E038B-61C0-4AE2-8CCD-2D076F03230E}" type="datetime1">
               <a:rPr lang="en-US" altLang="ru-RU" smtClean="0"/>
-              <a:t>4/22/2023</a:t>
+              <a:t>4/24/2023</a:t>
             </a:fld>
             <a:endParaRPr lang="en-GB" altLang="ru-RU"/>
           </a:p>
@@ -6101,7 +8958,7 @@
             </a:pPr>
             <a:fld id="{E055F4B6-7548-4B99-87BB-801C5733BE64}" type="datetime1">
               <a:rPr lang="en-US" altLang="ru-RU" smtClean="0"/>
-              <a:t>4/22/2023</a:t>
+              <a:t>4/24/2023</a:t>
             </a:fld>
             <a:endParaRPr lang="en-GB" altLang="ru-RU"/>
           </a:p>
@@ -6401,7 +9258,7 @@
             </a:pPr>
             <a:fld id="{07B18CBF-8FD4-452B-9A35-CB50C7264366}" type="datetime1">
               <a:rPr lang="en-US" altLang="ru-RU" smtClean="0"/>
-              <a:t>4/22/2023</a:t>
+              <a:t>4/24/2023</a:t>
             </a:fld>
             <a:endParaRPr lang="en-GB" altLang="ru-RU"/>
           </a:p>
@@ -6778,7 +9635,7 @@
             </a:pPr>
             <a:fld id="{EA317C73-2042-416C-8D1A-02B6DCD58F7B}" type="datetime1">
               <a:rPr lang="en-US" altLang="ru-RU" smtClean="0"/>
-              <a:t>4/22/2023</a:t>
+              <a:t>4/24/2023</a:t>
             </a:fld>
             <a:endParaRPr lang="en-GB" altLang="ru-RU"/>
           </a:p>
@@ -7621,7 +10478,7 @@
             </a:pPr>
             <a:fld id="{128E9935-2EED-429E-970A-C3F4CA1DEE58}" type="datetime1">
               <a:rPr lang="en-US" altLang="ru-RU" smtClean="0"/>
-              <a:t>4/22/2023</a:t>
+              <a:t>4/24/2023</a:t>
             </a:fld>
             <a:endParaRPr lang="ru-RU" altLang="ru-RU"/>
           </a:p>
@@ -8232,7 +11089,7 @@
                 <a:ea typeface="Roboto" panose="02000000000000000000" pitchFamily="2" charset="0"/>
                 <a:cs typeface="Arial" panose="020B0604020202020204" pitchFamily="34" charset="0"/>
               </a:rPr>
-              <a:t>Tornados : A Force of Nature</a:t>
+              <a:t>Tornadoes : A Force of Nature</a:t>
             </a:r>
           </a:p>
         </p:txBody>
@@ -8620,7 +11477,7 @@
             </a:pPr>
             <a:fld id="{67305771-719D-4E45-9256-1C73FE5D9DF0}" type="datetime1">
               <a:rPr lang="en-US" altLang="ru-RU" smtClean="0"/>
-              <a:t>4/22/2023</a:t>
+              <a:t>4/24/2023</a:t>
             </a:fld>
             <a:endParaRPr lang="ru-RU" altLang="ru-RU"/>
           </a:p>
@@ -8750,7 +11607,7 @@
             </a:pPr>
             <a:fld id="{7F943A04-7AF7-40DD-9268-159EF56FB974}" type="datetime1">
               <a:rPr lang="en-US" altLang="ru-RU" smtClean="0"/>
-              <a:t>4/22/2023</a:t>
+              <a:t>4/24/2023</a:t>
             </a:fld>
             <a:endParaRPr lang="en-GB" altLang="ru-RU"/>
           </a:p>
@@ -8928,7 +11785,7 @@
             </a:pPr>
             <a:fld id="{7F943A04-7AF7-40DD-9268-159EF56FB974}" type="datetime1">
               <a:rPr lang="en-US" altLang="ru-RU" smtClean="0"/>
-              <a:t>4/22/2023</a:t>
+              <a:t>4/24/2023</a:t>
             </a:fld>
             <a:endParaRPr lang="en-GB" altLang="ru-RU"/>
           </a:p>
@@ -9020,7 +11877,7 @@
             </a:pPr>
             <a:r>
               <a:rPr lang="en-US" sz="2400" dirty="0"/>
-              <a:t>Richard Malolepsy</a:t>
+              <a:t>Richard Malolepszy</a:t>
             </a:r>
           </a:p>
           <a:p>
@@ -9337,7 +12194,7 @@
         </p:nvSpPr>
         <p:spPr>
           <a:xfrm>
-            <a:off x="1547664" y="3364632"/>
+            <a:off x="1763688" y="916360"/>
             <a:ext cx="7772400" cy="1020762"/>
           </a:xfrm>
         </p:spPr>
@@ -9350,7 +12207,7 @@
             <a:pPr eaLnBrk="1" hangingPunct="1"/>
             <a:r>
               <a:rPr lang="en-US" altLang="ru-RU" b="1" dirty="0"/>
-              <a:t>Tornados in the USA</a:t>
+              <a:t>Tornadoes in the USA</a:t>
             </a:r>
             <a:endParaRPr lang="en-US" altLang="ru-RU" dirty="0"/>
           </a:p>
@@ -9374,7 +12231,7 @@
         </p:nvSpPr>
         <p:spPr>
           <a:xfrm>
-            <a:off x="3563888" y="3332569"/>
+            <a:off x="5076056" y="1060376"/>
             <a:ext cx="7772400" cy="1125538"/>
           </a:xfrm>
         </p:spPr>
@@ -9431,7 +12288,7 @@
                 </a:spcAft>
                 <a:defRPr/>
               </a:pPr>
-              <a:t>4/22/2023</a:t>
+              <a:t>4/24/2023</a:t>
             </a:fld>
             <a:endParaRPr lang="ru-RU" altLang="ru-RU"/>
           </a:p>
@@ -9516,7 +12373,7 @@
                 </a:spcAft>
                 <a:defRPr/>
               </a:pPr>
-              <a:t>4/22/2023</a:t>
+              <a:t>4/24/2023</a:t>
             </a:fld>
             <a:endParaRPr lang="ru-RU" altLang="ru-RU"/>
           </a:p>
@@ -9709,7 +12566,12 @@
             <p:ph type="title"/>
           </p:nvPr>
         </p:nvSpPr>
-        <p:spPr/>
+        <p:spPr>
+          <a:xfrm>
+            <a:off x="-252536" y="107156"/>
+            <a:ext cx="8207375" cy="866775"/>
+          </a:xfrm>
+        </p:spPr>
         <p:txBody>
           <a:bodyPr/>
           <a:lstStyle/>
@@ -9752,6 +12614,34 @@
           </a:p>
         </p:txBody>
       </p:sp>
+      <p:graphicFrame>
+        <p:nvGraphicFramePr>
+          <p:cNvPr id="10" name="Diagram 9">
+            <a:extLst>
+              <a:ext uri="{FF2B5EF4-FFF2-40B4-BE49-F238E27FC236}">
+                <a16:creationId xmlns:a16="http://schemas.microsoft.com/office/drawing/2014/main" id="{9634C1C0-5A89-7B91-BE41-388581203383}"/>
+              </a:ext>
+            </a:extLst>
+          </p:cNvPr>
+          <p:cNvGraphicFramePr/>
+          <p:nvPr>
+            <p:extLst>
+              <p:ext uri="{D42A27DB-BD31-4B8C-83A1-F6EECF244321}">
+                <p14:modId xmlns:p14="http://schemas.microsoft.com/office/powerpoint/2010/main" val="126784073"/>
+              </p:ext>
+            </p:extLst>
+          </p:nvPr>
+        </p:nvGraphicFramePr>
+        <p:xfrm>
+          <a:off x="323528" y="196280"/>
+          <a:ext cx="8568952" cy="4752528"/>
+        </p:xfrm>
+        <a:graphic>
+          <a:graphicData uri="http://schemas.openxmlformats.org/drawingml/2006/diagram">
+            <dgm:relIds xmlns:dgm="http://schemas.openxmlformats.org/drawingml/2006/diagram" xmlns:r="http://schemas.openxmlformats.org/officeDocument/2006/relationships" r:dm="rId2" r:lo="rId3" r:qs="rId4" r:cs="rId5"/>
+          </a:graphicData>
+        </a:graphic>
+      </p:graphicFrame>
     </p:spTree>
     <p:extLst>
       <p:ext uri="{BB962C8B-B14F-4D97-AF65-F5344CB8AC3E}">
@@ -9921,50 +12811,6 @@
       </p:sp>
       <p:sp>
         <p:nvSpPr>
-          <p:cNvPr id="7171" name="Rectangle 2">
-            <a:extLst>
-              <a:ext uri="{FF2B5EF4-FFF2-40B4-BE49-F238E27FC236}">
-                <a16:creationId xmlns:a16="http://schemas.microsoft.com/office/drawing/2014/main" id="{C5ADC666-64B6-9498-9EFC-6EB4AFE9DE74}"/>
-              </a:ext>
-            </a:extLst>
-          </p:cNvPr>
-          <p:cNvSpPr>
-            <a:spLocks noGrp="1" noChangeArrowheads="1"/>
-          </p:cNvSpPr>
-          <p:nvPr>
-            <p:ph type="title"/>
-          </p:nvPr>
-        </p:nvSpPr>
-        <p:spPr>
-          <a:xfrm>
-            <a:off x="1258888" y="339725"/>
-            <a:ext cx="7489825" cy="531813"/>
-          </a:xfrm>
-        </p:spPr>
-        <p:txBody>
-          <a:bodyPr/>
-          <a:lstStyle/>
-          <a:p>
-            <a:pPr algn="ctr" eaLnBrk="1" hangingPunct="1"/>
-            <a:r>
-              <a:rPr lang="en-US" b="1" dirty="0">
-                <a:solidFill>
-                  <a:srgbClr val="000000"/>
-                </a:solidFill>
-                <a:effectLst/>
-              </a:rPr>
-              <a:t>The Enhanced Fujita Scale</a:t>
-            </a:r>
-            <a:endParaRPr lang="en-US" altLang="ru-RU" dirty="0">
-              <a:solidFill>
-                <a:srgbClr val="000000"/>
-              </a:solidFill>
-            </a:endParaRPr>
-          </a:p>
-        </p:txBody>
-      </p:sp>
-      <p:sp>
-        <p:nvSpPr>
           <p:cNvPr id="5" name="Date Placeholder 4">
             <a:extLst>
               <a:ext uri="{FF2B5EF4-FFF2-40B4-BE49-F238E27FC236}">
@@ -9989,18 +12835,18 @@
             </a:pPr>
             <a:fld id="{098AFA16-369A-4648-BBFF-F13BBA101CBB}" type="datetime1">
               <a:rPr lang="en-US" altLang="ru-RU" smtClean="0"/>
-              <a:t>4/22/2023</a:t>
+              <a:t>4/24/2023</a:t>
             </a:fld>
-            <a:endParaRPr lang="ru-RU" altLang="ru-RU"/>
+            <a:endParaRPr lang="ru-RU" altLang="ru-RU" dirty="0"/>
           </a:p>
         </p:txBody>
       </p:sp>
       <p:pic>
         <p:nvPicPr>
-          <p:cNvPr id="3" name="Picture 2" descr="Chart, histogram&#10;&#10;Description automatically generated">
+          <p:cNvPr id="3" name="Picture 2" descr="Chart, bar chart&#10;&#10;Description automatically generated">
             <a:extLst>
               <a:ext uri="{FF2B5EF4-FFF2-40B4-BE49-F238E27FC236}">
-                <a16:creationId xmlns:a16="http://schemas.microsoft.com/office/drawing/2014/main" id="{E163C36C-AC8E-142D-5B05-42C6649BAA8A}"/>
+                <a16:creationId xmlns:a16="http://schemas.microsoft.com/office/drawing/2014/main" id="{5F360068-E6B5-8D91-EDEB-CBAB583ECF33}"/>
               </a:ext>
             </a:extLst>
           </p:cNvPr>
@@ -10009,7 +12855,7 @@
           </p:cNvPicPr>
           <p:nvPr/>
         </p:nvPicPr>
-        <p:blipFill rotWithShape="1">
+        <p:blipFill>
           <a:blip r:embed="rId2">
             <a:extLst>
               <a:ext uri="{28A0092B-C50C-407E-A947-70E740481C1C}">
@@ -10017,48 +12863,14 @@
               </a:ext>
             </a:extLst>
           </a:blip>
-          <a:srcRect r="19676"/>
-          <a:stretch/>
+          <a:stretch>
+            <a:fillRect/>
+          </a:stretch>
         </p:blipFill>
         <p:spPr>
           <a:xfrm>
-            <a:off x="1258888" y="1060376"/>
-            <a:ext cx="7344816" cy="2266586"/>
-          </a:xfrm>
-          <a:prstGeom prst="rect">
-            <a:avLst/>
-          </a:prstGeom>
-        </p:spPr>
-      </p:pic>
-      <p:pic>
-        <p:nvPicPr>
-          <p:cNvPr id="7" name="Picture 6" descr="Chart, histogram&#10;&#10;Description automatically generated">
-            <a:extLst>
-              <a:ext uri="{FF2B5EF4-FFF2-40B4-BE49-F238E27FC236}">
-                <a16:creationId xmlns:a16="http://schemas.microsoft.com/office/drawing/2014/main" id="{DCB951DA-E16C-CBE7-D9A4-06C931E18D91}"/>
-              </a:ext>
-            </a:extLst>
-          </p:cNvPr>
-          <p:cNvPicPr>
-            <a:picLocks noChangeAspect="1"/>
-          </p:cNvPicPr>
-          <p:nvPr/>
-        </p:nvPicPr>
-        <p:blipFill rotWithShape="1">
-          <a:blip r:embed="rId2">
-            <a:extLst>
-              <a:ext uri="{28A0092B-C50C-407E-A947-70E740481C1C}">
-                <a14:useLocalDpi xmlns:a14="http://schemas.microsoft.com/office/drawing/2010/main" val="0"/>
-              </a:ext>
-            </a:extLst>
-          </a:blip>
-          <a:srcRect l="79854" t="10115" r="-1296" b="19992"/>
-          <a:stretch/>
-        </p:blipFill>
-        <p:spPr>
-          <a:xfrm>
-            <a:off x="6524183" y="3025945"/>
-            <a:ext cx="2386608" cy="1898430"/>
+            <a:off x="1209207" y="103188"/>
+            <a:ext cx="7914546" cy="4938712"/>
           </a:xfrm>
           <a:prstGeom prst="rect">
             <a:avLst/>
@@ -10222,47 +13034,12 @@
           </a:p>
         </p:txBody>
       </p:sp>
-      <p:sp>
-        <p:nvSpPr>
-          <p:cNvPr id="6147" name="Rectangle 2">
+      <p:pic>
+        <p:nvPicPr>
+          <p:cNvPr id="3" name="Picture 2" descr="Map">
             <a:extLst>
               <a:ext uri="{FF2B5EF4-FFF2-40B4-BE49-F238E27FC236}">
-                <a16:creationId xmlns:a16="http://schemas.microsoft.com/office/drawing/2014/main" id="{E19D7572-0798-F6CA-4B31-66E142DB607D}"/>
-              </a:ext>
-            </a:extLst>
-          </p:cNvPr>
-          <p:cNvSpPr>
-            <a:spLocks noGrp="1" noChangeArrowheads="1"/>
-          </p:cNvSpPr>
-          <p:nvPr>
-            <p:ph type="title"/>
-          </p:nvPr>
-        </p:nvSpPr>
-        <p:spPr>
-          <a:xfrm>
-            <a:off x="395288" y="196850"/>
-            <a:ext cx="8350250" cy="700088"/>
-          </a:xfrm>
-        </p:spPr>
-        <p:txBody>
-          <a:bodyPr/>
-          <a:lstStyle/>
-          <a:p>
-            <a:pPr algn="ctr" eaLnBrk="1" hangingPunct="1"/>
-            <a:r>
-              <a:rPr lang="en-US" altLang="ru-RU" dirty="0"/>
-              <a:t>Tornados Map of the USA</a:t>
-            </a:r>
-            <a:endParaRPr lang="uk-UA" altLang="ru-RU" dirty="0"/>
-          </a:p>
-        </p:txBody>
-      </p:sp>
-      <p:pic>
-        <p:nvPicPr>
-          <p:cNvPr id="5" name="Picture 4" descr="Map&#10;&#10;Description automatically generated">
-            <a:extLst>
-              <a:ext uri="{FF2B5EF4-FFF2-40B4-BE49-F238E27FC236}">
-                <a16:creationId xmlns:a16="http://schemas.microsoft.com/office/drawing/2014/main" id="{F5B65B17-C21D-8A11-72A8-8336110E04A1}"/>
+                <a16:creationId xmlns:a16="http://schemas.microsoft.com/office/drawing/2014/main" id="{5F832F3F-0A7C-EFF3-48C1-D20B71C794D7}"/>
               </a:ext>
             </a:extLst>
           </p:cNvPr>
@@ -10271,7 +13048,7 @@
           </p:cNvPicPr>
           <p:nvPr/>
         </p:nvPicPr>
-        <p:blipFill rotWithShape="1">
+        <p:blipFill>
           <a:blip r:embed="rId2">
             <a:extLst>
               <a:ext uri="{28A0092B-C50C-407E-A947-70E740481C1C}">
@@ -10279,13 +13056,14 @@
               </a:ext>
             </a:extLst>
           </a:blip>
-          <a:srcRect t="17377" b="-4369"/>
-          <a:stretch/>
+          <a:stretch>
+            <a:fillRect/>
+          </a:stretch>
         </p:blipFill>
         <p:spPr>
           <a:xfrm>
-            <a:off x="-1587" y="1132384"/>
-            <a:ext cx="9144000" cy="4248348"/>
+            <a:off x="35496" y="52388"/>
+            <a:ext cx="9073008" cy="5040312"/>
           </a:xfrm>
           <a:prstGeom prst="rect">
             <a:avLst/>
@@ -10333,7 +13111,12 @@
             <p:ph type="title"/>
           </p:nvPr>
         </p:nvSpPr>
-        <p:spPr/>
+        <p:spPr>
+          <a:xfrm>
+            <a:off x="1259632" y="-116086"/>
+            <a:ext cx="7704856" cy="857250"/>
+          </a:xfrm>
+        </p:spPr>
         <p:txBody>
           <a:bodyPr/>
           <a:lstStyle/>
@@ -10349,12 +13132,42 @@
           </a:p>
         </p:txBody>
       </p:sp>
+      <p:sp>
+        <p:nvSpPr>
+          <p:cNvPr id="6" name="Slide Number Placeholder 5">
+            <a:extLst>
+              <a:ext uri="{FF2B5EF4-FFF2-40B4-BE49-F238E27FC236}">
+                <a16:creationId xmlns:a16="http://schemas.microsoft.com/office/drawing/2014/main" id="{A6795176-0EB2-9622-ABB2-3466BD01C80C}"/>
+              </a:ext>
+            </a:extLst>
+          </p:cNvPr>
+          <p:cNvSpPr>
+            <a:spLocks noGrp="1"/>
+          </p:cNvSpPr>
+          <p:nvPr>
+            <p:ph type="sldNum" sz="quarter" idx="12"/>
+          </p:nvPr>
+        </p:nvSpPr>
+        <p:spPr/>
+        <p:txBody>
+          <a:bodyPr/>
+          <a:lstStyle/>
+          <a:p>
+            <a:fld id="{23E8D19C-7DCB-4671-AFD9-7DC1DBA8C539}" type="slidenum">
+              <a:rPr lang="ru-RU" altLang="ru-RU" smtClean="0"/>
+              <a:pPr/>
+              <a:t>8</a:t>
+            </a:fld>
+            <a:endParaRPr lang="ru-RU" altLang="ru-RU"/>
+          </a:p>
+        </p:txBody>
+      </p:sp>
       <p:pic>
         <p:nvPicPr>
-          <p:cNvPr id="8" name="Content Placeholder 7" descr="Chart&#10;&#10;Description automatically generated with medium confidence">
+          <p:cNvPr id="5" name="Content Placeholder 4" descr="Map&#10;&#10;Description automatically generated">
             <a:extLst>
               <a:ext uri="{FF2B5EF4-FFF2-40B4-BE49-F238E27FC236}">
-                <a16:creationId xmlns:a16="http://schemas.microsoft.com/office/drawing/2014/main" id="{ABDEFBD6-996F-79C4-FE45-2AD577005C4B}"/>
+                <a16:creationId xmlns:a16="http://schemas.microsoft.com/office/drawing/2014/main" id="{1B73FE7E-3143-8083-C3A4-CECAA530046D}"/>
               </a:ext>
             </a:extLst>
           </p:cNvPr>
@@ -10379,41 +13192,11 @@
         </p:blipFill>
         <p:spPr>
           <a:xfrm>
-            <a:off x="1331913" y="1420416"/>
-            <a:ext cx="7354887" cy="2795131"/>
+            <a:off x="1331913" y="556320"/>
+            <a:ext cx="7632575" cy="4588768"/>
           </a:xfrm>
         </p:spPr>
       </p:pic>
-      <p:sp>
-        <p:nvSpPr>
-          <p:cNvPr id="6" name="Slide Number Placeholder 5">
-            <a:extLst>
-              <a:ext uri="{FF2B5EF4-FFF2-40B4-BE49-F238E27FC236}">
-                <a16:creationId xmlns:a16="http://schemas.microsoft.com/office/drawing/2014/main" id="{A6795176-0EB2-9622-ABB2-3466BD01C80C}"/>
-              </a:ext>
-            </a:extLst>
-          </p:cNvPr>
-          <p:cNvSpPr>
-            <a:spLocks noGrp="1"/>
-          </p:cNvSpPr>
-          <p:nvPr>
-            <p:ph type="sldNum" sz="quarter" idx="12"/>
-          </p:nvPr>
-        </p:nvSpPr>
-        <p:spPr/>
-        <p:txBody>
-          <a:bodyPr/>
-          <a:lstStyle/>
-          <a:p>
-            <a:fld id="{23E8D19C-7DCB-4671-AFD9-7DC1DBA8C539}" type="slidenum">
-              <a:rPr lang="ru-RU" altLang="ru-RU" smtClean="0"/>
-              <a:pPr/>
-              <a:t>8</a:t>
-            </a:fld>
-            <a:endParaRPr lang="ru-RU" altLang="ru-RU"/>
-          </a:p>
-        </p:txBody>
-      </p:sp>
     </p:spTree>
     <p:extLst>
       <p:ext uri="{BB962C8B-B14F-4D97-AF65-F5344CB8AC3E}">

</xml_diff>